<commit_message>
Revised PowerPoint based on old feedback
</commit_message>
<xml_diff>
--- a/NAO Sprint 2 Review.pptx
+++ b/NAO Sprint 2 Review.pptx
@@ -5,23 +5,26 @@
     <p:sldMasterId id="2147483672" r:id="rId1"/>
   </p:sldMasterIdLst>
   <p:notesMasterIdLst>
-    <p:notesMasterId r:id="rId16"/>
+    <p:notesMasterId r:id="rId19"/>
   </p:notesMasterIdLst>
   <p:sldIdLst>
     <p:sldId id="256" r:id="rId2"/>
     <p:sldId id="269" r:id="rId3"/>
-    <p:sldId id="257" r:id="rId4"/>
-    <p:sldId id="270" r:id="rId5"/>
-    <p:sldId id="271" r:id="rId6"/>
-    <p:sldId id="268" r:id="rId7"/>
-    <p:sldId id="263" r:id="rId8"/>
-    <p:sldId id="272" r:id="rId9"/>
-    <p:sldId id="273" r:id="rId10"/>
-    <p:sldId id="262" r:id="rId11"/>
-    <p:sldId id="264" r:id="rId12"/>
-    <p:sldId id="265" r:id="rId13"/>
-    <p:sldId id="266" r:id="rId14"/>
-    <p:sldId id="267" r:id="rId15"/>
+    <p:sldId id="274" r:id="rId4"/>
+    <p:sldId id="275" r:id="rId5"/>
+    <p:sldId id="257" r:id="rId6"/>
+    <p:sldId id="270" r:id="rId7"/>
+    <p:sldId id="271" r:id="rId8"/>
+    <p:sldId id="268" r:id="rId9"/>
+    <p:sldId id="276" r:id="rId10"/>
+    <p:sldId id="263" r:id="rId11"/>
+    <p:sldId id="272" r:id="rId12"/>
+    <p:sldId id="273" r:id="rId13"/>
+    <p:sldId id="262" r:id="rId14"/>
+    <p:sldId id="264" r:id="rId15"/>
+    <p:sldId id="265" r:id="rId16"/>
+    <p:sldId id="266" r:id="rId17"/>
+    <p:sldId id="267" r:id="rId18"/>
   </p:sldIdLst>
   <p:sldSz cx="9144000" cy="6858000" type="screen4x3"/>
   <p:notesSz cx="6858000" cy="9144000"/>
@@ -205,7 +208,7 @@
           <a:p>
             <a:fld id="{DCB7B2A0-E9F0-46ED-BBF7-19366A224793}" type="datetimeFigureOut">
               <a:rPr lang="en-US" smtClean="0"/>
-              <a:t>10/18/2016</a:t>
+              <a:t>10/19/2016</a:t>
             </a:fld>
             <a:endParaRPr lang="en-US"/>
           </a:p>
@@ -630,7 +633,7 @@
           <a:p>
             <a:fld id="{2F4DDD21-05C1-45C4-937C-208594A25839}" type="slidenum">
               <a:rPr lang="en-US" smtClean="0"/>
-              <a:t>3</a:t>
+              <a:t>5</a:t>
             </a:fld>
             <a:endParaRPr lang="en-US"/>
           </a:p>
@@ -718,7 +721,7 @@
           <a:p>
             <a:fld id="{2F4DDD21-05C1-45C4-937C-208594A25839}" type="slidenum">
               <a:rPr lang="en-US" smtClean="0"/>
-              <a:t>6</a:t>
+              <a:t>8</a:t>
             </a:fld>
             <a:endParaRPr lang="en-US"/>
           </a:p>
@@ -816,7 +819,7 @@
           <a:p>
             <a:fld id="{2F4DDD21-05C1-45C4-937C-208594A25839}" type="slidenum">
               <a:rPr lang="en-US" smtClean="0"/>
-              <a:t>7</a:t>
+              <a:t>10</a:t>
             </a:fld>
             <a:endParaRPr lang="en-US"/>
           </a:p>
@@ -900,7 +903,7 @@
           <a:p>
             <a:fld id="{2F4DDD21-05C1-45C4-937C-208594A25839}" type="slidenum">
               <a:rPr lang="en-US" smtClean="0"/>
-              <a:t>10</a:t>
+              <a:t>13</a:t>
             </a:fld>
             <a:endParaRPr lang="en-US"/>
           </a:p>
@@ -988,7 +991,7 @@
           <a:p>
             <a:fld id="{2F4DDD21-05C1-45C4-937C-208594A25839}" type="slidenum">
               <a:rPr lang="en-US" smtClean="0"/>
-              <a:t>11</a:t>
+              <a:t>14</a:t>
             </a:fld>
             <a:endParaRPr lang="en-US"/>
           </a:p>
@@ -1076,7 +1079,7 @@
           <a:p>
             <a:fld id="{2F4DDD21-05C1-45C4-937C-208594A25839}" type="slidenum">
               <a:rPr lang="en-US" smtClean="0"/>
-              <a:t>12</a:t>
+              <a:t>15</a:t>
             </a:fld>
             <a:endParaRPr lang="en-US"/>
           </a:p>
@@ -3852,7 +3855,7 @@
           <a:p>
             <a:fld id="{7DCF6802-A5BA-4CDA-9D55-8EF8829C64BD}" type="datetimeFigureOut">
               <a:rPr lang="en-US" smtClean="0"/>
-              <a:t>10/18/2016</a:t>
+              <a:t>10/19/2016</a:t>
             </a:fld>
             <a:endParaRPr lang="en-US"/>
           </a:p>
@@ -4137,7 +4140,7 @@
           <a:p>
             <a:fld id="{7DCF6802-A5BA-4CDA-9D55-8EF8829C64BD}" type="datetimeFigureOut">
               <a:rPr lang="en-US" smtClean="0"/>
-              <a:t>10/18/2016</a:t>
+              <a:t>10/19/2016</a:t>
             </a:fld>
             <a:endParaRPr lang="en-US"/>
           </a:p>
@@ -4312,7 +4315,7 @@
           <a:p>
             <a:fld id="{7DCF6802-A5BA-4CDA-9D55-8EF8829C64BD}" type="datetimeFigureOut">
               <a:rPr lang="en-US" smtClean="0"/>
-              <a:t>10/18/2016</a:t>
+              <a:t>10/19/2016</a:t>
             </a:fld>
             <a:endParaRPr lang="en-US"/>
           </a:p>
@@ -4477,7 +4480,7 @@
           <a:p>
             <a:fld id="{7DCF6802-A5BA-4CDA-9D55-8EF8829C64BD}" type="datetimeFigureOut">
               <a:rPr lang="en-US" smtClean="0"/>
-              <a:t>10/18/2016</a:t>
+              <a:t>10/19/2016</a:t>
             </a:fld>
             <a:endParaRPr lang="en-US"/>
           </a:p>
@@ -4718,7 +4721,7 @@
           <a:p>
             <a:fld id="{7DCF6802-A5BA-4CDA-9D55-8EF8829C64BD}" type="datetimeFigureOut">
               <a:rPr lang="en-US" smtClean="0"/>
-              <a:t>10/18/2016</a:t>
+              <a:t>10/19/2016</a:t>
             </a:fld>
             <a:endParaRPr lang="en-US"/>
           </a:p>
@@ -4831,7 +4834,7 @@
           <a:p>
             <a:fld id="{7DCF6802-A5BA-4CDA-9D55-8EF8829C64BD}" type="datetimeFigureOut">
               <a:rPr lang="en-US" smtClean="0"/>
-              <a:t>10/18/2016</a:t>
+              <a:t>10/19/2016</a:t>
             </a:fld>
             <a:endParaRPr lang="en-US"/>
           </a:p>
@@ -5370,7 +5373,7 @@
           <a:p>
             <a:fld id="{7DCF6802-A5BA-4CDA-9D55-8EF8829C64BD}" type="datetimeFigureOut">
               <a:rPr lang="en-US" smtClean="0"/>
-              <a:t>10/18/2016</a:t>
+              <a:t>10/19/2016</a:t>
             </a:fld>
             <a:endParaRPr lang="en-US"/>
           </a:p>
@@ -5483,7 +5486,7 @@
           <a:p>
             <a:fld id="{7DCF6802-A5BA-4CDA-9D55-8EF8829C64BD}" type="datetimeFigureOut">
               <a:rPr lang="en-US" smtClean="0"/>
-              <a:t>10/18/2016</a:t>
+              <a:t>10/19/2016</a:t>
             </a:fld>
             <a:endParaRPr lang="en-US"/>
           </a:p>
@@ -5573,7 +5576,7 @@
           <a:p>
             <a:fld id="{7DCF6802-A5BA-4CDA-9D55-8EF8829C64BD}" type="datetimeFigureOut">
               <a:rPr lang="en-US" smtClean="0"/>
-              <a:t>10/18/2016</a:t>
+              <a:t>10/19/2016</a:t>
             </a:fld>
             <a:endParaRPr lang="en-US"/>
           </a:p>
@@ -8224,7 +8227,7 @@
           <a:p>
             <a:fld id="{7DCF6802-A5BA-4CDA-9D55-8EF8829C64BD}" type="datetimeFigureOut">
               <a:rPr lang="en-US" smtClean="0"/>
-              <a:t>10/18/2016</a:t>
+              <a:t>10/19/2016</a:t>
             </a:fld>
             <a:endParaRPr lang="en-US"/>
           </a:p>
@@ -11436,7 +11439,7 @@
           <a:p>
             <a:fld id="{7DCF6802-A5BA-4CDA-9D55-8EF8829C64BD}" type="datetimeFigureOut">
               <a:rPr lang="en-US" smtClean="0"/>
-              <a:t>10/18/2016</a:t>
+              <a:t>10/19/2016</a:t>
             </a:fld>
             <a:endParaRPr lang="en-US"/>
           </a:p>
@@ -14258,7 +14261,7 @@
           <a:p>
             <a:fld id="{7DCF6802-A5BA-4CDA-9D55-8EF8829C64BD}" type="datetimeFigureOut">
               <a:rPr lang="en-US" smtClean="0"/>
-              <a:t>10/18/2016</a:t>
+              <a:t>10/19/2016</a:t>
             </a:fld>
             <a:endParaRPr lang="en-US"/>
           </a:p>
@@ -14738,15 +14741,7 @@
           <a:p>
             <a:r>
               <a:rPr lang="en-US" dirty="0" smtClean="0"/>
-              <a:t>NAO Sprint </a:t>
-            </a:r>
-            <a:r>
-              <a:rPr lang="en-US" dirty="0" smtClean="0"/>
-              <a:t>2 </a:t>
-            </a:r>
-            <a:r>
-              <a:rPr lang="en-US" dirty="0" smtClean="0"/>
-              <a:t>Review</a:t>
+              <a:t>NAO Sprint 2 Review</a:t>
             </a:r>
             <a:endParaRPr lang="en-US" dirty="0"/>
           </a:p>
@@ -14859,7 +14854,7 @@
           <a:p>
             <a:r>
               <a:rPr lang="en-US" dirty="0" smtClean="0"/>
-              <a:t>Demo</a:t>
+              <a:t>Test Plan</a:t>
             </a:r>
             <a:endParaRPr lang="en-US" dirty="0"/>
           </a:p>
@@ -14880,1269 +14875,21 @@
           <a:bodyPr/>
           <a:lstStyle/>
           <a:p>
-            <a:pPr marL="68580" indent="0">
-              <a:buNone/>
-            </a:pPr>
-            <a:endParaRPr lang="en-US" dirty="0"/>
-          </a:p>
-        </p:txBody>
-      </p:sp>
-    </p:spTree>
-    <p:extLst>
-      <p:ext uri="{BB962C8B-B14F-4D97-AF65-F5344CB8AC3E}">
-        <p14:creationId xmlns:p14="http://schemas.microsoft.com/office/powerpoint/2010/main" val="2458645403"/>
-      </p:ext>
-    </p:extLst>
-  </p:cSld>
-  <p:clrMapOvr>
-    <a:masterClrMapping/>
-  </p:clrMapOvr>
-</p:sld>
-</file>
-
-<file path=ppt/slides/slide11.xml><?xml version="1.0" encoding="utf-8"?>
-<p:sld xmlns:a="http://schemas.openxmlformats.org/drawingml/2006/main" xmlns:r="http://schemas.openxmlformats.org/officeDocument/2006/relationships" xmlns:p="http://schemas.openxmlformats.org/presentationml/2006/main">
-  <p:cSld>
-    <p:spTree>
-      <p:nvGrpSpPr>
-        <p:cNvPr id="1" name=""/>
-        <p:cNvGrpSpPr/>
-        <p:nvPr/>
-      </p:nvGrpSpPr>
-      <p:grpSpPr>
-        <a:xfrm>
-          <a:off x="0" y="0"/>
-          <a:ext cx="0" cy="0"/>
-          <a:chOff x="0" y="0"/>
-          <a:chExt cx="0" cy="0"/>
-        </a:xfrm>
-      </p:grpSpPr>
-      <p:sp>
-        <p:nvSpPr>
-          <p:cNvPr id="2" name="Title 1"/>
-          <p:cNvSpPr>
-            <a:spLocks noGrp="1"/>
-          </p:cNvSpPr>
-          <p:nvPr>
-            <p:ph type="title"/>
-          </p:nvPr>
-        </p:nvSpPr>
-        <p:spPr/>
-        <p:txBody>
-          <a:bodyPr>
-            <a:normAutofit fontScale="90000"/>
-          </a:bodyPr>
-          <a:lstStyle/>
-          <a:p>
             <a:r>
               <a:rPr lang="en-US" dirty="0" smtClean="0"/>
-              <a:t>Anticipated Goals for Next Sprint</a:t>
-            </a:r>
-            <a:endParaRPr lang="en-US" dirty="0"/>
-          </a:p>
-        </p:txBody>
-      </p:sp>
-      <p:sp>
-        <p:nvSpPr>
-          <p:cNvPr id="3" name="Content Placeholder 2"/>
-          <p:cNvSpPr>
-            <a:spLocks noGrp="1"/>
-          </p:cNvSpPr>
-          <p:nvPr>
-            <p:ph idx="1"/>
-          </p:nvPr>
-        </p:nvSpPr>
-        <p:spPr/>
-        <p:txBody>
-          <a:bodyPr>
-            <a:normAutofit/>
-          </a:bodyPr>
-          <a:lstStyle/>
+              <a:t>Testing is performed incrementally anytime code is physically run on the robot</a:t>
+            </a:r>
+          </a:p>
           <a:p>
             <a:r>
               <a:rPr lang="en-US" dirty="0" smtClean="0"/>
-              <a:t>Continue Exploring Capabilities</a:t>
-            </a:r>
-            <a:endParaRPr lang="en-US" dirty="0" smtClean="0"/>
+              <a:t>Verifying animations and flow of program</a:t>
+            </a:r>
           </a:p>
           <a:p>
             <a:r>
               <a:rPr lang="en-US" dirty="0" smtClean="0"/>
-              <a:t>K-5 Emotions Demo</a:t>
-            </a:r>
-            <a:endParaRPr lang="en-US" dirty="0" smtClean="0"/>
-          </a:p>
-          <a:p>
-            <a:r>
-              <a:rPr lang="en-US" dirty="0" smtClean="0"/>
-              <a:t>Continue working on enhancing </a:t>
-            </a:r>
-            <a:r>
-              <a:rPr lang="en-US" dirty="0"/>
-              <a:t>Rock-Paper-Scissors game with visual </a:t>
-            </a:r>
-            <a:r>
-              <a:rPr lang="en-US" dirty="0" smtClean="0"/>
-              <a:t>recognition</a:t>
-            </a:r>
-          </a:p>
-          <a:p>
-            <a:r>
-              <a:rPr lang="en-US" dirty="0" smtClean="0"/>
-              <a:t>Fix the High-Low game.</a:t>
-            </a:r>
-          </a:p>
-          <a:p>
-            <a:r>
-              <a:rPr lang="en-US" dirty="0" smtClean="0"/>
-              <a:t>Start work on the number recognition game.</a:t>
-            </a:r>
-          </a:p>
-        </p:txBody>
-      </p:sp>
-    </p:spTree>
-    <p:extLst>
-      <p:ext uri="{BB962C8B-B14F-4D97-AF65-F5344CB8AC3E}">
-        <p14:creationId xmlns:p14="http://schemas.microsoft.com/office/powerpoint/2010/main" val="1401099517"/>
-      </p:ext>
-    </p:extLst>
-  </p:cSld>
-  <p:clrMapOvr>
-    <a:masterClrMapping/>
-  </p:clrMapOvr>
-</p:sld>
-</file>
-
-<file path=ppt/slides/slide12.xml><?xml version="1.0" encoding="utf-8"?>
-<p:sld xmlns:a="http://schemas.openxmlformats.org/drawingml/2006/main" xmlns:r="http://schemas.openxmlformats.org/officeDocument/2006/relationships" xmlns:p="http://schemas.openxmlformats.org/presentationml/2006/main">
-  <p:cSld>
-    <p:spTree>
-      <p:nvGrpSpPr>
-        <p:cNvPr id="1" name=""/>
-        <p:cNvGrpSpPr/>
-        <p:nvPr/>
-      </p:nvGrpSpPr>
-      <p:grpSpPr>
-        <a:xfrm>
-          <a:off x="0" y="0"/>
-          <a:ext cx="0" cy="0"/>
-          <a:chOff x="0" y="0"/>
-          <a:chExt cx="0" cy="0"/>
-        </a:xfrm>
-      </p:grpSpPr>
-      <p:sp>
-        <p:nvSpPr>
-          <p:cNvPr id="2" name="Title 1"/>
-          <p:cNvSpPr>
-            <a:spLocks noGrp="1"/>
-          </p:cNvSpPr>
-          <p:nvPr>
-            <p:ph type="title"/>
-          </p:nvPr>
-        </p:nvSpPr>
-        <p:spPr/>
-        <p:txBody>
-          <a:bodyPr/>
-          <a:lstStyle/>
-          <a:p>
-            <a:r>
-              <a:rPr lang="en-US" dirty="0" smtClean="0"/>
-              <a:t>Summary and Takeaways</a:t>
-            </a:r>
-            <a:endParaRPr lang="en-US" dirty="0"/>
-          </a:p>
-        </p:txBody>
-      </p:sp>
-      <p:sp>
-        <p:nvSpPr>
-          <p:cNvPr id="3" name="Content Placeholder 2"/>
-          <p:cNvSpPr>
-            <a:spLocks noGrp="1"/>
-          </p:cNvSpPr>
-          <p:nvPr>
-            <p:ph idx="1"/>
-          </p:nvPr>
-        </p:nvSpPr>
-        <p:spPr/>
-        <p:txBody>
-          <a:bodyPr/>
-          <a:lstStyle/>
-          <a:p>
-            <a:r>
-              <a:rPr lang="en-US" dirty="0" smtClean="0"/>
-              <a:t>Robots </a:t>
-            </a:r>
-            <a:r>
-              <a:rPr lang="en-US" dirty="0" smtClean="0"/>
-              <a:t>are </a:t>
-            </a:r>
-            <a:r>
-              <a:rPr lang="en-US" dirty="0" smtClean="0"/>
-              <a:t>fragile</a:t>
-            </a:r>
-          </a:p>
-          <a:p>
-            <a:r>
-              <a:rPr lang="en-US" dirty="0" smtClean="0"/>
-              <a:t>Sprint schedule was very compacted</a:t>
-            </a:r>
-          </a:p>
-          <a:p>
-            <a:r>
-              <a:rPr lang="en-US" dirty="0" smtClean="0"/>
-              <a:t>Improve Work Efficiency</a:t>
-            </a:r>
-          </a:p>
-          <a:p>
-            <a:pPr lvl="1"/>
-            <a:r>
-              <a:rPr lang="en-US" dirty="0" smtClean="0"/>
-              <a:t>Based on 3 hours per lesson, 81% Efficiency</a:t>
-            </a:r>
-          </a:p>
-          <a:p>
-            <a:pPr lvl="1"/>
-            <a:r>
-              <a:rPr lang="en-US" dirty="0" smtClean="0"/>
-              <a:t>More Even Workload</a:t>
-            </a:r>
-            <a:endParaRPr lang="en-US" dirty="0" smtClean="0"/>
-          </a:p>
-          <a:p>
-            <a:endParaRPr lang="en-US" dirty="0"/>
-          </a:p>
-        </p:txBody>
-      </p:sp>
-    </p:spTree>
-    <p:extLst>
-      <p:ext uri="{BB962C8B-B14F-4D97-AF65-F5344CB8AC3E}">
-        <p14:creationId xmlns:p14="http://schemas.microsoft.com/office/powerpoint/2010/main" val="138357413"/>
-      </p:ext>
-    </p:extLst>
-  </p:cSld>
-  <p:clrMapOvr>
-    <a:masterClrMapping/>
-  </p:clrMapOvr>
-</p:sld>
-</file>
-
-<file path=ppt/slides/slide13.xml><?xml version="1.0" encoding="utf-8"?>
-<p:sld xmlns:a="http://schemas.openxmlformats.org/drawingml/2006/main" xmlns:r="http://schemas.openxmlformats.org/officeDocument/2006/relationships" xmlns:p="http://schemas.openxmlformats.org/presentationml/2006/main">
-  <p:cSld>
-    <p:spTree>
-      <p:nvGrpSpPr>
-        <p:cNvPr id="1" name=""/>
-        <p:cNvGrpSpPr/>
-        <p:nvPr/>
-      </p:nvGrpSpPr>
-      <p:grpSpPr>
-        <a:xfrm>
-          <a:off x="0" y="0"/>
-          <a:ext cx="0" cy="0"/>
-          <a:chOff x="0" y="0"/>
-          <a:chExt cx="0" cy="0"/>
-        </a:xfrm>
-      </p:grpSpPr>
-      <p:sp>
-        <p:nvSpPr>
-          <p:cNvPr id="2" name="Title 1"/>
-          <p:cNvSpPr>
-            <a:spLocks noGrp="1"/>
-          </p:cNvSpPr>
-          <p:nvPr>
-            <p:ph type="title"/>
-          </p:nvPr>
-        </p:nvSpPr>
-        <p:spPr/>
-        <p:txBody>
-          <a:bodyPr/>
-          <a:lstStyle/>
-          <a:p>
-            <a:r>
-              <a:rPr lang="en-US" dirty="0" smtClean="0"/>
-              <a:t>Documentation</a:t>
-            </a:r>
-            <a:endParaRPr lang="en-US" dirty="0"/>
-          </a:p>
-        </p:txBody>
-      </p:sp>
-      <p:sp>
-        <p:nvSpPr>
-          <p:cNvPr id="3" name="Content Placeholder 2"/>
-          <p:cNvSpPr>
-            <a:spLocks noGrp="1"/>
-          </p:cNvSpPr>
-          <p:nvPr>
-            <p:ph idx="1"/>
-          </p:nvPr>
-        </p:nvSpPr>
-        <p:spPr/>
-        <p:txBody>
-          <a:bodyPr/>
-          <a:lstStyle/>
-          <a:p>
-            <a:r>
-              <a:rPr lang="en-US" dirty="0" smtClean="0"/>
-              <a:t>None.</a:t>
-            </a:r>
-            <a:endParaRPr lang="en-US" dirty="0"/>
-          </a:p>
-        </p:txBody>
-      </p:sp>
-    </p:spTree>
-    <p:extLst>
-      <p:ext uri="{BB962C8B-B14F-4D97-AF65-F5344CB8AC3E}">
-        <p14:creationId xmlns:p14="http://schemas.microsoft.com/office/powerpoint/2010/main" val="1578546148"/>
-      </p:ext>
-    </p:extLst>
-  </p:cSld>
-  <p:clrMapOvr>
-    <a:masterClrMapping/>
-  </p:clrMapOvr>
-</p:sld>
-</file>
-
-<file path=ppt/slides/slide14.xml><?xml version="1.0" encoding="utf-8"?>
-<p:sld xmlns:a="http://schemas.openxmlformats.org/drawingml/2006/main" xmlns:r="http://schemas.openxmlformats.org/officeDocument/2006/relationships" xmlns:p="http://schemas.openxmlformats.org/presentationml/2006/main">
-  <p:cSld>
-    <p:spTree>
-      <p:nvGrpSpPr>
-        <p:cNvPr id="1" name=""/>
-        <p:cNvGrpSpPr/>
-        <p:nvPr/>
-      </p:nvGrpSpPr>
-      <p:grpSpPr>
-        <a:xfrm>
-          <a:off x="0" y="0"/>
-          <a:ext cx="0" cy="0"/>
-          <a:chOff x="0" y="0"/>
-          <a:chExt cx="0" cy="0"/>
-        </a:xfrm>
-      </p:grpSpPr>
-      <p:sp>
-        <p:nvSpPr>
-          <p:cNvPr id="2" name="Title 1"/>
-          <p:cNvSpPr>
-            <a:spLocks noGrp="1"/>
-          </p:cNvSpPr>
-          <p:nvPr>
-            <p:ph type="title"/>
-          </p:nvPr>
-        </p:nvSpPr>
-        <p:spPr/>
-        <p:txBody>
-          <a:bodyPr/>
-          <a:lstStyle/>
-          <a:p>
-            <a:r>
-              <a:rPr lang="en-US" dirty="0" smtClean="0"/>
-              <a:t>Questions?</a:t>
-            </a:r>
-            <a:endParaRPr lang="en-US" dirty="0"/>
-          </a:p>
-        </p:txBody>
-      </p:sp>
-      <p:sp>
-        <p:nvSpPr>
-          <p:cNvPr id="3" name="Content Placeholder 2"/>
-          <p:cNvSpPr>
-            <a:spLocks noGrp="1"/>
-          </p:cNvSpPr>
-          <p:nvPr>
-            <p:ph idx="1"/>
-          </p:nvPr>
-        </p:nvSpPr>
-        <p:spPr/>
-        <p:txBody>
-          <a:bodyPr/>
-          <a:lstStyle/>
-          <a:p>
-            <a:endParaRPr lang="en-US"/>
-          </a:p>
-        </p:txBody>
-      </p:sp>
-    </p:spTree>
-    <p:extLst>
-      <p:ext uri="{BB962C8B-B14F-4D97-AF65-F5344CB8AC3E}">
-        <p14:creationId xmlns:p14="http://schemas.microsoft.com/office/powerpoint/2010/main" val="3565531884"/>
-      </p:ext>
-    </p:extLst>
-  </p:cSld>
-  <p:clrMapOvr>
-    <a:masterClrMapping/>
-  </p:clrMapOvr>
-</p:sld>
-</file>
-
-<file path=ppt/slides/slide2.xml><?xml version="1.0" encoding="utf-8"?>
-<p:sld xmlns:a="http://schemas.openxmlformats.org/drawingml/2006/main" xmlns:r="http://schemas.openxmlformats.org/officeDocument/2006/relationships" xmlns:p="http://schemas.openxmlformats.org/presentationml/2006/main">
-  <p:cSld>
-    <p:spTree>
-      <p:nvGrpSpPr>
-        <p:cNvPr id="1" name=""/>
-        <p:cNvGrpSpPr/>
-        <p:nvPr/>
-      </p:nvGrpSpPr>
-      <p:grpSpPr>
-        <a:xfrm>
-          <a:off x="0" y="0"/>
-          <a:ext cx="0" cy="0"/>
-          <a:chOff x="0" y="0"/>
-          <a:chExt cx="0" cy="0"/>
-        </a:xfrm>
-      </p:grpSpPr>
-      <p:sp>
-        <p:nvSpPr>
-          <p:cNvPr id="2" name="Title 1"/>
-          <p:cNvSpPr>
-            <a:spLocks noGrp="1"/>
-          </p:cNvSpPr>
-          <p:nvPr>
-            <p:ph type="title"/>
-          </p:nvPr>
-        </p:nvSpPr>
-        <p:spPr/>
-        <p:txBody>
-          <a:bodyPr>
-            <a:normAutofit fontScale="90000"/>
-          </a:bodyPr>
-          <a:lstStyle/>
-          <a:p>
-            <a:r>
-              <a:rPr lang="en-US" dirty="0" smtClean="0"/>
-              <a:t>Sprint 1 Retrospective Meeting</a:t>
-            </a:r>
-            <a:endParaRPr lang="en-US" dirty="0"/>
-          </a:p>
-        </p:txBody>
-      </p:sp>
-      <p:sp>
-        <p:nvSpPr>
-          <p:cNvPr id="3" name="Content Placeholder 2"/>
-          <p:cNvSpPr>
-            <a:spLocks noGrp="1"/>
-          </p:cNvSpPr>
-          <p:nvPr>
-            <p:ph idx="1"/>
-          </p:nvPr>
-        </p:nvSpPr>
-        <p:spPr/>
-        <p:txBody>
-          <a:bodyPr/>
-          <a:lstStyle/>
-          <a:p>
-            <a:r>
-              <a:rPr lang="en-US" dirty="0" smtClean="0"/>
-              <a:t>Need to make better use of Scrum</a:t>
-            </a:r>
-          </a:p>
-          <a:p>
-            <a:r>
-              <a:rPr lang="en-US" dirty="0" smtClean="0"/>
-              <a:t>Gained hours of familiarity with Nao System</a:t>
-            </a:r>
-          </a:p>
-          <a:p>
-            <a:r>
-              <a:rPr lang="en-US" dirty="0" smtClean="0"/>
-              <a:t>Good distribution of Work</a:t>
-            </a:r>
-          </a:p>
-          <a:p>
-            <a:r>
-              <a:rPr lang="en-US" dirty="0" smtClean="0"/>
-              <a:t>Use a combined demo in future</a:t>
-            </a:r>
-          </a:p>
-          <a:p>
-            <a:r>
-              <a:rPr lang="en-US" dirty="0" smtClean="0"/>
-              <a:t>Need better hour tracking</a:t>
-            </a:r>
-            <a:endParaRPr lang="en-US" dirty="0"/>
-          </a:p>
-        </p:txBody>
-      </p:sp>
-    </p:spTree>
-    <p:extLst>
-      <p:ext uri="{BB962C8B-B14F-4D97-AF65-F5344CB8AC3E}">
-        <p14:creationId xmlns:p14="http://schemas.microsoft.com/office/powerpoint/2010/main" val="1694226758"/>
-      </p:ext>
-    </p:extLst>
-  </p:cSld>
-  <p:clrMapOvr>
-    <a:masterClrMapping/>
-  </p:clrMapOvr>
-</p:sld>
-</file>
-
-<file path=ppt/slides/slide3.xml><?xml version="1.0" encoding="utf-8"?>
-<p:sld xmlns:a="http://schemas.openxmlformats.org/drawingml/2006/main" xmlns:r="http://schemas.openxmlformats.org/officeDocument/2006/relationships" xmlns:p="http://schemas.openxmlformats.org/presentationml/2006/main">
-  <p:cSld>
-    <p:spTree>
-      <p:nvGrpSpPr>
-        <p:cNvPr id="1" name=""/>
-        <p:cNvGrpSpPr/>
-        <p:nvPr/>
-      </p:nvGrpSpPr>
-      <p:grpSpPr>
-        <a:xfrm>
-          <a:off x="0" y="0"/>
-          <a:ext cx="0" cy="0"/>
-          <a:chOff x="0" y="0"/>
-          <a:chExt cx="0" cy="0"/>
-        </a:xfrm>
-      </p:grpSpPr>
-      <p:sp>
-        <p:nvSpPr>
-          <p:cNvPr id="2" name="Title 1"/>
-          <p:cNvSpPr>
-            <a:spLocks noGrp="1"/>
-          </p:cNvSpPr>
-          <p:nvPr>
-            <p:ph type="title"/>
-          </p:nvPr>
-        </p:nvSpPr>
-        <p:spPr/>
-        <p:txBody>
-          <a:bodyPr/>
-          <a:lstStyle/>
-          <a:p>
-            <a:r>
-              <a:rPr lang="en-US" dirty="0" smtClean="0"/>
-              <a:t>Sprint 2 Backlog Items	</a:t>
-            </a:r>
-            <a:endParaRPr lang="en-US" dirty="0"/>
-          </a:p>
-        </p:txBody>
-      </p:sp>
-      <p:sp>
-        <p:nvSpPr>
-          <p:cNvPr id="3" name="Content Placeholder 2"/>
-          <p:cNvSpPr>
-            <a:spLocks noGrp="1"/>
-          </p:cNvSpPr>
-          <p:nvPr>
-            <p:ph idx="1"/>
-          </p:nvPr>
-        </p:nvSpPr>
-        <p:spPr/>
-        <p:txBody>
-          <a:bodyPr>
-            <a:normAutofit lnSpcReduction="10000"/>
-          </a:bodyPr>
-          <a:lstStyle/>
-          <a:p>
-            <a:r>
-              <a:rPr lang="en-US" dirty="0" smtClean="0"/>
-              <a:t>Finish Rock-Paper-Scissors</a:t>
-            </a:r>
-          </a:p>
-          <a:p>
-            <a:pPr lvl="1"/>
-            <a:r>
-              <a:rPr lang="en-US" dirty="0" smtClean="0"/>
-              <a:t>Fix Choices (2 </a:t>
-            </a:r>
-            <a:r>
-              <a:rPr lang="en-US" dirty="0" err="1" smtClean="0"/>
-              <a:t>hr</a:t>
-            </a:r>
-            <a:r>
-              <a:rPr lang="en-US" dirty="0" smtClean="0"/>
-              <a:t>)</a:t>
-            </a:r>
-          </a:p>
-          <a:p>
-            <a:pPr lvl="1"/>
-            <a:r>
-              <a:rPr lang="en-US" dirty="0" smtClean="0"/>
-              <a:t>Add extra animations (4 </a:t>
-            </a:r>
-            <a:r>
-              <a:rPr lang="en-US" dirty="0" err="1" smtClean="0"/>
-              <a:t>hr</a:t>
-            </a:r>
-            <a:r>
-              <a:rPr lang="en-US" dirty="0" smtClean="0"/>
-              <a:t>)</a:t>
-            </a:r>
-          </a:p>
-          <a:p>
-            <a:pPr lvl="1"/>
-            <a:r>
-              <a:rPr lang="en-US" dirty="0" smtClean="0"/>
-              <a:t>Beta Testing (2 </a:t>
-            </a:r>
-            <a:r>
-              <a:rPr lang="en-US" dirty="0" err="1" smtClean="0"/>
-              <a:t>hr</a:t>
-            </a:r>
-            <a:r>
-              <a:rPr lang="en-US" dirty="0" smtClean="0"/>
-              <a:t>)</a:t>
-            </a:r>
-            <a:endParaRPr lang="en-US" dirty="0"/>
-          </a:p>
-          <a:p>
-            <a:r>
-              <a:rPr lang="en-US" dirty="0" smtClean="0"/>
-              <a:t>Fix access to code repository</a:t>
-            </a:r>
-            <a:r>
-              <a:rPr lang="en-US" dirty="0"/>
-              <a:t> </a:t>
-            </a:r>
-            <a:r>
-              <a:rPr lang="en-US" dirty="0" smtClean="0"/>
-              <a:t>(30 min)</a:t>
-            </a:r>
-          </a:p>
-          <a:p>
-            <a:r>
-              <a:rPr lang="en-US" dirty="0" smtClean="0"/>
-              <a:t>Sprint Review Prep</a:t>
-            </a:r>
-          </a:p>
-          <a:p>
-            <a:pPr lvl="1"/>
-            <a:r>
-              <a:rPr lang="en-US" dirty="0" smtClean="0"/>
-              <a:t>Demo (2 </a:t>
-            </a:r>
-            <a:r>
-              <a:rPr lang="en-US" dirty="0" err="1" smtClean="0"/>
-              <a:t>hr</a:t>
-            </a:r>
-            <a:r>
-              <a:rPr lang="en-US" dirty="0" smtClean="0"/>
-              <a:t>)</a:t>
-            </a:r>
-          </a:p>
-          <a:p>
-            <a:pPr lvl="1"/>
-            <a:r>
-              <a:rPr lang="en-US" dirty="0" smtClean="0"/>
-              <a:t>Presentation (2 </a:t>
-            </a:r>
-            <a:r>
-              <a:rPr lang="en-US" dirty="0" err="1" smtClean="0"/>
-              <a:t>hr</a:t>
-            </a:r>
-            <a:r>
-              <a:rPr lang="en-US" dirty="0" smtClean="0"/>
-              <a:t>)</a:t>
-            </a:r>
-          </a:p>
-          <a:p>
-            <a:pPr lvl="1"/>
-            <a:r>
-              <a:rPr lang="en-US" dirty="0" smtClean="0"/>
-              <a:t>Admin Framework (3 </a:t>
-            </a:r>
-            <a:r>
-              <a:rPr lang="en-US" dirty="0" err="1" smtClean="0"/>
-              <a:t>hr</a:t>
-            </a:r>
-            <a:r>
-              <a:rPr lang="en-US" dirty="0" smtClean="0"/>
-              <a:t>)</a:t>
-            </a:r>
-            <a:endParaRPr lang="en-US" dirty="0" smtClean="0"/>
-          </a:p>
-        </p:txBody>
-      </p:sp>
-    </p:spTree>
-    <p:extLst>
-      <p:ext uri="{BB962C8B-B14F-4D97-AF65-F5344CB8AC3E}">
-        <p14:creationId xmlns:p14="http://schemas.microsoft.com/office/powerpoint/2010/main" val="3954483666"/>
-      </p:ext>
-    </p:extLst>
-  </p:cSld>
-  <p:clrMapOvr>
-    <a:masterClrMapping/>
-  </p:clrMapOvr>
-</p:sld>
-</file>
-
-<file path=ppt/slides/slide4.xml><?xml version="1.0" encoding="utf-8"?>
-<p:sld xmlns:a="http://schemas.openxmlformats.org/drawingml/2006/main" xmlns:r="http://schemas.openxmlformats.org/officeDocument/2006/relationships" xmlns:p="http://schemas.openxmlformats.org/presentationml/2006/main">
-  <p:cSld>
-    <p:spTree>
-      <p:nvGrpSpPr>
-        <p:cNvPr id="1" name=""/>
-        <p:cNvGrpSpPr/>
-        <p:nvPr/>
-      </p:nvGrpSpPr>
-      <p:grpSpPr>
-        <a:xfrm>
-          <a:off x="0" y="0"/>
-          <a:ext cx="0" cy="0"/>
-          <a:chOff x="0" y="0"/>
-          <a:chExt cx="0" cy="0"/>
-        </a:xfrm>
-      </p:grpSpPr>
-      <p:sp>
-        <p:nvSpPr>
-          <p:cNvPr id="2" name="Title 1"/>
-          <p:cNvSpPr>
-            <a:spLocks noGrp="1"/>
-          </p:cNvSpPr>
-          <p:nvPr>
-            <p:ph type="title"/>
-          </p:nvPr>
-        </p:nvSpPr>
-        <p:spPr>
-          <a:xfrm>
-            <a:off x="1043490" y="1027664"/>
-            <a:ext cx="7490910" cy="1143000"/>
-          </a:xfrm>
-        </p:spPr>
-        <p:txBody>
-          <a:bodyPr>
-            <a:normAutofit/>
-          </a:bodyPr>
-          <a:lstStyle/>
-          <a:p>
-            <a:r>
-              <a:rPr lang="en-US" dirty="0" smtClean="0"/>
-              <a:t>Sprint 2 Backlog Items (Cont.)</a:t>
-            </a:r>
-            <a:endParaRPr lang="en-US" dirty="0"/>
-          </a:p>
-        </p:txBody>
-      </p:sp>
-      <p:sp>
-        <p:nvSpPr>
-          <p:cNvPr id="3" name="Content Placeholder 2"/>
-          <p:cNvSpPr>
-            <a:spLocks noGrp="1"/>
-          </p:cNvSpPr>
-          <p:nvPr>
-            <p:ph idx="1"/>
-          </p:nvPr>
-        </p:nvSpPr>
-        <p:spPr/>
-        <p:txBody>
-          <a:bodyPr>
-            <a:normAutofit fontScale="92500" lnSpcReduction="10000"/>
-          </a:bodyPr>
-          <a:lstStyle/>
-          <a:p>
-            <a:r>
-              <a:rPr lang="en-US" dirty="0" smtClean="0"/>
-              <a:t>Finish High-Low</a:t>
-            </a:r>
-          </a:p>
-          <a:p>
-            <a:pPr lvl="1"/>
-            <a:r>
-              <a:rPr lang="en-US" dirty="0" smtClean="0"/>
-              <a:t>Code Exploration (6 </a:t>
-            </a:r>
-            <a:r>
-              <a:rPr lang="en-US" dirty="0" err="1" smtClean="0"/>
-              <a:t>hr</a:t>
-            </a:r>
-            <a:r>
-              <a:rPr lang="en-US" dirty="0" smtClean="0"/>
-              <a:t>)</a:t>
-            </a:r>
-          </a:p>
-          <a:p>
-            <a:pPr lvl="1"/>
-            <a:r>
-              <a:rPr lang="en-US" dirty="0" smtClean="0"/>
-              <a:t>Beta Testing (2 </a:t>
-            </a:r>
-            <a:r>
-              <a:rPr lang="en-US" dirty="0" err="1" smtClean="0"/>
-              <a:t>hr</a:t>
-            </a:r>
-            <a:r>
-              <a:rPr lang="en-US" dirty="0" smtClean="0"/>
-              <a:t>)</a:t>
-            </a:r>
-          </a:p>
-          <a:p>
-            <a:pPr lvl="1"/>
-            <a:r>
-              <a:rPr lang="en-US" dirty="0" smtClean="0"/>
-              <a:t>Attitude Dialog (2 </a:t>
-            </a:r>
-            <a:r>
-              <a:rPr lang="en-US" dirty="0" err="1" smtClean="0"/>
-              <a:t>hr</a:t>
-            </a:r>
-            <a:r>
-              <a:rPr lang="en-US" dirty="0" smtClean="0"/>
-              <a:t>)</a:t>
-            </a:r>
-          </a:p>
-          <a:p>
-            <a:r>
-              <a:rPr lang="en-US" dirty="0" smtClean="0"/>
-              <a:t>Alter Star Wars Demo</a:t>
-            </a:r>
-          </a:p>
-          <a:p>
-            <a:pPr lvl="1"/>
-            <a:r>
-              <a:rPr lang="en-US" dirty="0" smtClean="0"/>
-              <a:t>Do not sit down at end (1 </a:t>
-            </a:r>
-            <a:r>
-              <a:rPr lang="en-US" dirty="0" err="1" smtClean="0"/>
-              <a:t>hr</a:t>
-            </a:r>
-            <a:r>
-              <a:rPr lang="en-US" dirty="0" smtClean="0"/>
-              <a:t>)</a:t>
-            </a:r>
-          </a:p>
-          <a:p>
-            <a:r>
-              <a:rPr lang="en-US" dirty="0" smtClean="0"/>
-              <a:t>Explore Capabilities</a:t>
-            </a:r>
-          </a:p>
-          <a:p>
-            <a:pPr lvl="1"/>
-            <a:r>
-              <a:rPr lang="en-US" dirty="0" smtClean="0"/>
-              <a:t>Range Finding (5 </a:t>
-            </a:r>
-            <a:r>
-              <a:rPr lang="en-US" dirty="0" err="1" smtClean="0"/>
-              <a:t>hr</a:t>
-            </a:r>
-            <a:r>
-              <a:rPr lang="en-US" dirty="0" smtClean="0"/>
-              <a:t>)</a:t>
-            </a:r>
-          </a:p>
-          <a:p>
-            <a:pPr lvl="1"/>
-            <a:r>
-              <a:rPr lang="en-US" dirty="0" smtClean="0"/>
-              <a:t>Facial Recognition (5 </a:t>
-            </a:r>
-            <a:r>
-              <a:rPr lang="en-US" dirty="0" err="1" smtClean="0"/>
-              <a:t>hr</a:t>
-            </a:r>
-            <a:r>
-              <a:rPr lang="en-US" dirty="0" smtClean="0"/>
-              <a:t>)</a:t>
-            </a:r>
-          </a:p>
-          <a:p>
-            <a:pPr lvl="1"/>
-            <a:r>
-              <a:rPr lang="en-US" dirty="0" smtClean="0"/>
-              <a:t>Support Asimov’s 3 Laws (5 </a:t>
-            </a:r>
-            <a:r>
-              <a:rPr lang="en-US" dirty="0" err="1" smtClean="0"/>
-              <a:t>hr</a:t>
-            </a:r>
-            <a:r>
-              <a:rPr lang="en-US" dirty="0" smtClean="0"/>
-              <a:t>)</a:t>
-            </a:r>
-          </a:p>
-        </p:txBody>
-      </p:sp>
-    </p:spTree>
-    <p:extLst>
-      <p:ext uri="{BB962C8B-B14F-4D97-AF65-F5344CB8AC3E}">
-        <p14:creationId xmlns:p14="http://schemas.microsoft.com/office/powerpoint/2010/main" val="936794108"/>
-      </p:ext>
-    </p:extLst>
-  </p:cSld>
-  <p:clrMapOvr>
-    <a:masterClrMapping/>
-  </p:clrMapOvr>
-</p:sld>
-</file>
-
-<file path=ppt/slides/slide5.xml><?xml version="1.0" encoding="utf-8"?>
-<p:sld xmlns:a="http://schemas.openxmlformats.org/drawingml/2006/main" xmlns:r="http://schemas.openxmlformats.org/officeDocument/2006/relationships" xmlns:p="http://schemas.openxmlformats.org/presentationml/2006/main">
-  <p:cSld>
-    <p:spTree>
-      <p:nvGrpSpPr>
-        <p:cNvPr id="1" name=""/>
-        <p:cNvGrpSpPr/>
-        <p:nvPr/>
-      </p:nvGrpSpPr>
-      <p:grpSpPr>
-        <a:xfrm>
-          <a:off x="0" y="0"/>
-          <a:ext cx="0" cy="0"/>
-          <a:chOff x="0" y="0"/>
-          <a:chExt cx="0" cy="0"/>
-        </a:xfrm>
-      </p:grpSpPr>
-      <p:sp>
-        <p:nvSpPr>
-          <p:cNvPr id="2" name="Title 1"/>
-          <p:cNvSpPr>
-            <a:spLocks noGrp="1"/>
-          </p:cNvSpPr>
-          <p:nvPr>
-            <p:ph type="title"/>
-          </p:nvPr>
-        </p:nvSpPr>
-        <p:spPr>
-          <a:xfrm>
-            <a:off x="1043490" y="1027664"/>
-            <a:ext cx="7414710" cy="1143000"/>
-          </a:xfrm>
-        </p:spPr>
-        <p:txBody>
-          <a:bodyPr>
-            <a:normAutofit/>
-          </a:bodyPr>
-          <a:lstStyle/>
-          <a:p>
-            <a:r>
-              <a:rPr lang="en-US" dirty="0" smtClean="0"/>
-              <a:t>Sprint 2 Backlog Items (Cont.)</a:t>
-            </a:r>
-            <a:endParaRPr lang="en-US" dirty="0"/>
-          </a:p>
-        </p:txBody>
-      </p:sp>
-      <p:sp>
-        <p:nvSpPr>
-          <p:cNvPr id="3" name="Content Placeholder 2"/>
-          <p:cNvSpPr>
-            <a:spLocks noGrp="1"/>
-          </p:cNvSpPr>
-          <p:nvPr>
-            <p:ph idx="1"/>
-          </p:nvPr>
-        </p:nvSpPr>
-        <p:spPr/>
-        <p:txBody>
-          <a:bodyPr>
-            <a:normAutofit lnSpcReduction="10000"/>
-          </a:bodyPr>
-          <a:lstStyle/>
-          <a:p>
-            <a:r>
-              <a:rPr lang="en-US" dirty="0" smtClean="0"/>
-              <a:t>K-5 Emotions Demo</a:t>
-            </a:r>
-          </a:p>
-          <a:p>
-            <a:pPr lvl="1"/>
-            <a:r>
-              <a:rPr lang="en-US" dirty="0" smtClean="0"/>
-              <a:t>“I’m tired, I need a break”</a:t>
-            </a:r>
-          </a:p>
-          <a:p>
-            <a:pPr lvl="1"/>
-            <a:r>
-              <a:rPr lang="en-US" dirty="0" smtClean="0"/>
-              <a:t>“I’m confused”</a:t>
-            </a:r>
-          </a:p>
-          <a:p>
-            <a:pPr lvl="1"/>
-            <a:r>
-              <a:rPr lang="en-US" dirty="0" smtClean="0"/>
-              <a:t>Perform in an animated manner (6 </a:t>
-            </a:r>
-            <a:r>
-              <a:rPr lang="en-US" dirty="0" err="1" smtClean="0"/>
-              <a:t>hr</a:t>
-            </a:r>
-            <a:r>
-              <a:rPr lang="en-US" dirty="0" smtClean="0"/>
-              <a:t>)</a:t>
-            </a:r>
-          </a:p>
-          <a:p>
-            <a:pPr lvl="1"/>
-            <a:r>
-              <a:rPr lang="en-US" dirty="0" smtClean="0"/>
-              <a:t>Add additional responses (4 </a:t>
-            </a:r>
-            <a:r>
-              <a:rPr lang="en-US" dirty="0" err="1" smtClean="0"/>
-              <a:t>hr</a:t>
-            </a:r>
-            <a:r>
-              <a:rPr lang="en-US" dirty="0" smtClean="0"/>
-              <a:t>)</a:t>
-            </a:r>
-          </a:p>
-          <a:p>
-            <a:pPr lvl="2"/>
-            <a:r>
-              <a:rPr lang="en-US" dirty="0" smtClean="0"/>
-              <a:t>Happy</a:t>
-            </a:r>
-          </a:p>
-          <a:p>
-            <a:pPr lvl="2"/>
-            <a:r>
-              <a:rPr lang="en-US" dirty="0" smtClean="0"/>
-              <a:t>Sad</a:t>
-            </a:r>
-          </a:p>
-          <a:p>
-            <a:pPr lvl="2"/>
-            <a:r>
-              <a:rPr lang="en-US" dirty="0" smtClean="0"/>
-              <a:t>Excited</a:t>
-            </a:r>
-          </a:p>
-          <a:p>
-            <a:pPr lvl="2"/>
-            <a:r>
-              <a:rPr lang="en-US" dirty="0" smtClean="0"/>
-              <a:t>“Whatever” (Indifference)</a:t>
-            </a:r>
-            <a:endParaRPr lang="en-US" dirty="0"/>
-          </a:p>
-        </p:txBody>
-      </p:sp>
-    </p:spTree>
-    <p:extLst>
-      <p:ext uri="{BB962C8B-B14F-4D97-AF65-F5344CB8AC3E}">
-        <p14:creationId xmlns:p14="http://schemas.microsoft.com/office/powerpoint/2010/main" val="849700090"/>
-      </p:ext>
-    </p:extLst>
-  </p:cSld>
-  <p:clrMapOvr>
-    <a:masterClrMapping/>
-  </p:clrMapOvr>
-</p:sld>
-</file>
-
-<file path=ppt/slides/slide6.xml><?xml version="1.0" encoding="utf-8"?>
-<p:sld xmlns:a="http://schemas.openxmlformats.org/drawingml/2006/main" xmlns:r="http://schemas.openxmlformats.org/officeDocument/2006/relationships" xmlns:p="http://schemas.openxmlformats.org/presentationml/2006/main">
-  <p:cSld>
-    <p:spTree>
-      <p:nvGrpSpPr>
-        <p:cNvPr id="1" name=""/>
-        <p:cNvGrpSpPr/>
-        <p:nvPr/>
-      </p:nvGrpSpPr>
-      <p:grpSpPr>
-        <a:xfrm>
-          <a:off x="0" y="0"/>
-          <a:ext cx="0" cy="0"/>
-          <a:chOff x="0" y="0"/>
-          <a:chExt cx="0" cy="0"/>
-        </a:xfrm>
-      </p:grpSpPr>
-      <p:sp>
-        <p:nvSpPr>
-          <p:cNvPr id="2" name="Title 1"/>
-          <p:cNvSpPr>
-            <a:spLocks noGrp="1"/>
-          </p:cNvSpPr>
-          <p:nvPr>
-            <p:ph type="title"/>
-          </p:nvPr>
-        </p:nvSpPr>
-        <p:spPr/>
-        <p:txBody>
-          <a:bodyPr/>
-          <a:lstStyle/>
-          <a:p>
-            <a:r>
-              <a:rPr lang="en-US" dirty="0" smtClean="0"/>
-              <a:t>Design Model</a:t>
-            </a:r>
-            <a:endParaRPr lang="en-US" dirty="0"/>
-          </a:p>
-        </p:txBody>
-      </p:sp>
-      <p:sp>
-        <p:nvSpPr>
-          <p:cNvPr id="3" name="Content Placeholder 2"/>
-          <p:cNvSpPr>
-            <a:spLocks noGrp="1"/>
-          </p:cNvSpPr>
-          <p:nvPr>
-            <p:ph idx="1"/>
-          </p:nvPr>
-        </p:nvSpPr>
-        <p:spPr/>
-        <p:txBody>
-          <a:bodyPr/>
-          <a:lstStyle/>
-          <a:p>
-            <a:r>
-              <a:rPr lang="en-US" dirty="0" smtClean="0"/>
-              <a:t>System architecture</a:t>
-            </a:r>
-          </a:p>
-          <a:p>
-            <a:pPr lvl="1"/>
-            <a:r>
-              <a:rPr lang="en-US" dirty="0" err="1" smtClean="0"/>
-              <a:t>Choregraphe</a:t>
-            </a:r>
-            <a:endParaRPr lang="en-US" dirty="0" smtClean="0"/>
-          </a:p>
-          <a:p>
-            <a:r>
-              <a:rPr lang="en-US" dirty="0" smtClean="0"/>
-              <a:t>Risks</a:t>
-            </a:r>
-          </a:p>
-          <a:p>
-            <a:pPr lvl="1"/>
-            <a:r>
-              <a:rPr lang="en-US" dirty="0" smtClean="0"/>
-              <a:t>Health of the robot</a:t>
-            </a:r>
-          </a:p>
-          <a:p>
-            <a:pPr lvl="1"/>
-            <a:r>
-              <a:rPr lang="en-US" dirty="0" smtClean="0"/>
-              <a:t>Locating old source </a:t>
-            </a:r>
-            <a:r>
-              <a:rPr lang="en-US" dirty="0" smtClean="0"/>
-              <a:t>code</a:t>
-            </a:r>
-          </a:p>
-          <a:p>
-            <a:pPr lvl="1"/>
-            <a:r>
-              <a:rPr lang="en-US" dirty="0" smtClean="0"/>
-              <a:t>Compacted Schedule</a:t>
-            </a:r>
-          </a:p>
-          <a:p>
-            <a:pPr lvl="1"/>
-            <a:r>
-              <a:rPr lang="en-US" dirty="0" smtClean="0"/>
-              <a:t>4 lessons for Sprint Review</a:t>
-            </a:r>
-            <a:endParaRPr lang="en-US" dirty="0" smtClean="0"/>
-          </a:p>
-          <a:p>
-            <a:pPr lvl="1"/>
-            <a:endParaRPr lang="en-US" dirty="0"/>
-          </a:p>
-        </p:txBody>
-      </p:sp>
-    </p:spTree>
-    <p:extLst>
-      <p:ext uri="{BB962C8B-B14F-4D97-AF65-F5344CB8AC3E}">
-        <p14:creationId xmlns:p14="http://schemas.microsoft.com/office/powerpoint/2010/main" val="2347316857"/>
-      </p:ext>
-    </p:extLst>
-  </p:cSld>
-  <p:clrMapOvr>
-    <a:masterClrMapping/>
-  </p:clrMapOvr>
-</p:sld>
-</file>
-
-<file path=ppt/slides/slide7.xml><?xml version="1.0" encoding="utf-8"?>
-<p:sld xmlns:a="http://schemas.openxmlformats.org/drawingml/2006/main" xmlns:r="http://schemas.openxmlformats.org/officeDocument/2006/relationships" xmlns:p="http://schemas.openxmlformats.org/presentationml/2006/main">
-  <p:cSld>
-    <p:spTree>
-      <p:nvGrpSpPr>
-        <p:cNvPr id="1" name=""/>
-        <p:cNvGrpSpPr/>
-        <p:nvPr/>
-      </p:nvGrpSpPr>
-      <p:grpSpPr>
-        <a:xfrm>
-          <a:off x="0" y="0"/>
-          <a:ext cx="0" cy="0"/>
-          <a:chOff x="0" y="0"/>
-          <a:chExt cx="0" cy="0"/>
-        </a:xfrm>
-      </p:grpSpPr>
-      <p:sp>
-        <p:nvSpPr>
-          <p:cNvPr id="2" name="Title 1"/>
-          <p:cNvSpPr>
-            <a:spLocks noGrp="1"/>
-          </p:cNvSpPr>
-          <p:nvPr>
-            <p:ph type="title"/>
-          </p:nvPr>
-        </p:nvSpPr>
-        <p:spPr/>
-        <p:txBody>
-          <a:bodyPr/>
-          <a:lstStyle/>
-          <a:p>
-            <a:r>
-              <a:rPr lang="en-US" dirty="0" smtClean="0"/>
-              <a:t>Test Plan</a:t>
-            </a:r>
-            <a:endParaRPr lang="en-US" dirty="0"/>
-          </a:p>
-        </p:txBody>
-      </p:sp>
-      <p:sp>
-        <p:nvSpPr>
-          <p:cNvPr id="3" name="Content Placeholder 2"/>
-          <p:cNvSpPr>
-            <a:spLocks noGrp="1"/>
-          </p:cNvSpPr>
-          <p:nvPr>
-            <p:ph idx="1"/>
-          </p:nvPr>
-        </p:nvSpPr>
-        <p:spPr/>
-        <p:txBody>
-          <a:bodyPr/>
-          <a:lstStyle/>
-          <a:p>
-            <a:r>
-              <a:rPr lang="en-US" dirty="0" smtClean="0"/>
-              <a:t>Rock-Paper-Scissors</a:t>
-            </a:r>
-          </a:p>
-          <a:p>
-            <a:pPr lvl="1"/>
-            <a:r>
-              <a:rPr lang="en-US" dirty="0" smtClean="0"/>
-              <a:t>Test all possible inputs/outputs for the </a:t>
-            </a:r>
-            <a:r>
-              <a:rPr lang="en-US" dirty="0" smtClean="0"/>
-              <a:t>game</a:t>
-            </a:r>
-          </a:p>
-          <a:p>
-            <a:pPr lvl="1"/>
-            <a:r>
-              <a:rPr lang="en-US" dirty="0" smtClean="0"/>
-              <a:t>Player Testing</a:t>
-            </a:r>
-            <a:endParaRPr lang="en-US" dirty="0" smtClean="0"/>
-          </a:p>
-          <a:p>
-            <a:r>
-              <a:rPr lang="en-US" dirty="0" smtClean="0"/>
-              <a:t>Stand-alone behaviors</a:t>
-            </a:r>
-          </a:p>
-          <a:p>
-            <a:pPr lvl="1"/>
-            <a:r>
-              <a:rPr lang="en-US" dirty="0" smtClean="0"/>
-              <a:t>Stability testing for </a:t>
-            </a:r>
-            <a:r>
-              <a:rPr lang="en-US" dirty="0" smtClean="0"/>
-              <a:t>movements</a:t>
+              <a:t>Finding random people to test robot functionality (Beta testing)</a:t>
             </a:r>
             <a:endParaRPr lang="en-US" dirty="0"/>
           </a:p>
@@ -16161,7 +14908,7 @@
 </p:sld>
 </file>
 
-<file path=ppt/slides/slide8.xml><?xml version="1.0" encoding="utf-8"?>
+<file path=ppt/slides/slide11.xml><?xml version="1.0" encoding="utf-8"?>
 <p:sld xmlns:a="http://schemas.openxmlformats.org/drawingml/2006/main" xmlns:r="http://schemas.openxmlformats.org/officeDocument/2006/relationships" xmlns:p="http://schemas.openxmlformats.org/presentationml/2006/main">
   <p:cSld>
     <p:spTree>
@@ -16287,7 +15034,7 @@
 </p:sld>
 </file>
 
-<file path=ppt/slides/slide9.xml><?xml version="1.0" encoding="utf-8"?>
+<file path=ppt/slides/slide12.xml><?xml version="1.0" encoding="utf-8"?>
 <p:sld xmlns:a="http://schemas.openxmlformats.org/drawingml/2006/main" xmlns:r="http://schemas.openxmlformats.org/officeDocument/2006/relationships" xmlns:p="http://schemas.openxmlformats.org/presentationml/2006/main">
   <p:cSld>
     <p:spTree>
@@ -16402,6 +15149,1841 @@
     <p:extLst>
       <p:ext uri="{BB962C8B-B14F-4D97-AF65-F5344CB8AC3E}">
         <p14:creationId xmlns:p14="http://schemas.microsoft.com/office/powerpoint/2010/main" val="3170484833"/>
+      </p:ext>
+    </p:extLst>
+  </p:cSld>
+  <p:clrMapOvr>
+    <a:masterClrMapping/>
+  </p:clrMapOvr>
+</p:sld>
+</file>
+
+<file path=ppt/slides/slide13.xml><?xml version="1.0" encoding="utf-8"?>
+<p:sld xmlns:a="http://schemas.openxmlformats.org/drawingml/2006/main" xmlns:r="http://schemas.openxmlformats.org/officeDocument/2006/relationships" xmlns:p="http://schemas.openxmlformats.org/presentationml/2006/main">
+  <p:cSld>
+    <p:spTree>
+      <p:nvGrpSpPr>
+        <p:cNvPr id="1" name=""/>
+        <p:cNvGrpSpPr/>
+        <p:nvPr/>
+      </p:nvGrpSpPr>
+      <p:grpSpPr>
+        <a:xfrm>
+          <a:off x="0" y="0"/>
+          <a:ext cx="0" cy="0"/>
+          <a:chOff x="0" y="0"/>
+          <a:chExt cx="0" cy="0"/>
+        </a:xfrm>
+      </p:grpSpPr>
+      <p:sp>
+        <p:nvSpPr>
+          <p:cNvPr id="2" name="Title 1"/>
+          <p:cNvSpPr>
+            <a:spLocks noGrp="1"/>
+          </p:cNvSpPr>
+          <p:nvPr>
+            <p:ph type="title"/>
+          </p:nvPr>
+        </p:nvSpPr>
+        <p:spPr/>
+        <p:txBody>
+          <a:bodyPr/>
+          <a:lstStyle/>
+          <a:p>
+            <a:r>
+              <a:rPr lang="en-US" dirty="0" smtClean="0"/>
+              <a:t>Demo</a:t>
+            </a:r>
+            <a:endParaRPr lang="en-US" dirty="0"/>
+          </a:p>
+        </p:txBody>
+      </p:sp>
+      <p:sp>
+        <p:nvSpPr>
+          <p:cNvPr id="3" name="Content Placeholder 2"/>
+          <p:cNvSpPr>
+            <a:spLocks noGrp="1"/>
+          </p:cNvSpPr>
+          <p:nvPr>
+            <p:ph idx="1"/>
+          </p:nvPr>
+        </p:nvSpPr>
+        <p:spPr/>
+        <p:txBody>
+          <a:bodyPr/>
+          <a:lstStyle/>
+          <a:p>
+            <a:pPr marL="68580" indent="0">
+              <a:buNone/>
+            </a:pPr>
+            <a:endParaRPr lang="en-US" dirty="0"/>
+          </a:p>
+        </p:txBody>
+      </p:sp>
+    </p:spTree>
+    <p:extLst>
+      <p:ext uri="{BB962C8B-B14F-4D97-AF65-F5344CB8AC3E}">
+        <p14:creationId xmlns:p14="http://schemas.microsoft.com/office/powerpoint/2010/main" val="2458645403"/>
+      </p:ext>
+    </p:extLst>
+  </p:cSld>
+  <p:clrMapOvr>
+    <a:masterClrMapping/>
+  </p:clrMapOvr>
+</p:sld>
+</file>
+
+<file path=ppt/slides/slide14.xml><?xml version="1.0" encoding="utf-8"?>
+<p:sld xmlns:a="http://schemas.openxmlformats.org/drawingml/2006/main" xmlns:r="http://schemas.openxmlformats.org/officeDocument/2006/relationships" xmlns:p="http://schemas.openxmlformats.org/presentationml/2006/main">
+  <p:cSld>
+    <p:spTree>
+      <p:nvGrpSpPr>
+        <p:cNvPr id="1" name=""/>
+        <p:cNvGrpSpPr/>
+        <p:nvPr/>
+      </p:nvGrpSpPr>
+      <p:grpSpPr>
+        <a:xfrm>
+          <a:off x="0" y="0"/>
+          <a:ext cx="0" cy="0"/>
+          <a:chOff x="0" y="0"/>
+          <a:chExt cx="0" cy="0"/>
+        </a:xfrm>
+      </p:grpSpPr>
+      <p:sp>
+        <p:nvSpPr>
+          <p:cNvPr id="2" name="Title 1"/>
+          <p:cNvSpPr>
+            <a:spLocks noGrp="1"/>
+          </p:cNvSpPr>
+          <p:nvPr>
+            <p:ph type="title"/>
+          </p:nvPr>
+        </p:nvSpPr>
+        <p:spPr/>
+        <p:txBody>
+          <a:bodyPr>
+            <a:normAutofit fontScale="90000"/>
+          </a:bodyPr>
+          <a:lstStyle/>
+          <a:p>
+            <a:r>
+              <a:rPr lang="en-US" dirty="0" smtClean="0"/>
+              <a:t>Anticipated Goals for Next Sprint</a:t>
+            </a:r>
+            <a:endParaRPr lang="en-US" dirty="0"/>
+          </a:p>
+        </p:txBody>
+      </p:sp>
+      <p:sp>
+        <p:nvSpPr>
+          <p:cNvPr id="3" name="Content Placeholder 2"/>
+          <p:cNvSpPr>
+            <a:spLocks noGrp="1"/>
+          </p:cNvSpPr>
+          <p:nvPr>
+            <p:ph idx="1"/>
+          </p:nvPr>
+        </p:nvSpPr>
+        <p:spPr/>
+        <p:txBody>
+          <a:bodyPr>
+            <a:normAutofit/>
+          </a:bodyPr>
+          <a:lstStyle/>
+          <a:p>
+            <a:r>
+              <a:rPr lang="en-US" dirty="0" smtClean="0"/>
+              <a:t>Continue Exploring Capabilities</a:t>
+            </a:r>
+          </a:p>
+          <a:p>
+            <a:r>
+              <a:rPr lang="en-US" dirty="0" smtClean="0"/>
+              <a:t>K-5 Emotions Demo</a:t>
+            </a:r>
+          </a:p>
+          <a:p>
+            <a:r>
+              <a:rPr lang="en-US" dirty="0" smtClean="0"/>
+              <a:t>Continue working on enhancing </a:t>
+            </a:r>
+            <a:r>
+              <a:rPr lang="en-US" dirty="0"/>
+              <a:t>Rock-Paper-Scissors game with visual </a:t>
+            </a:r>
+            <a:r>
+              <a:rPr lang="en-US" dirty="0" smtClean="0"/>
+              <a:t>recognition</a:t>
+            </a:r>
+          </a:p>
+          <a:p>
+            <a:r>
+              <a:rPr lang="en-US" dirty="0" smtClean="0"/>
+              <a:t>Fix the High-Low game.</a:t>
+            </a:r>
+          </a:p>
+          <a:p>
+            <a:r>
+              <a:rPr lang="en-US" dirty="0" smtClean="0"/>
+              <a:t>Start work on the number recognition game.</a:t>
+            </a:r>
+          </a:p>
+        </p:txBody>
+      </p:sp>
+    </p:spTree>
+    <p:extLst>
+      <p:ext uri="{BB962C8B-B14F-4D97-AF65-F5344CB8AC3E}">
+        <p14:creationId xmlns:p14="http://schemas.microsoft.com/office/powerpoint/2010/main" val="1401099517"/>
+      </p:ext>
+    </p:extLst>
+  </p:cSld>
+  <p:clrMapOvr>
+    <a:masterClrMapping/>
+  </p:clrMapOvr>
+</p:sld>
+</file>
+
+<file path=ppt/slides/slide15.xml><?xml version="1.0" encoding="utf-8"?>
+<p:sld xmlns:a="http://schemas.openxmlformats.org/drawingml/2006/main" xmlns:r="http://schemas.openxmlformats.org/officeDocument/2006/relationships" xmlns:p="http://schemas.openxmlformats.org/presentationml/2006/main">
+  <p:cSld>
+    <p:spTree>
+      <p:nvGrpSpPr>
+        <p:cNvPr id="1" name=""/>
+        <p:cNvGrpSpPr/>
+        <p:nvPr/>
+      </p:nvGrpSpPr>
+      <p:grpSpPr>
+        <a:xfrm>
+          <a:off x="0" y="0"/>
+          <a:ext cx="0" cy="0"/>
+          <a:chOff x="0" y="0"/>
+          <a:chExt cx="0" cy="0"/>
+        </a:xfrm>
+      </p:grpSpPr>
+      <p:sp>
+        <p:nvSpPr>
+          <p:cNvPr id="2" name="Title 1"/>
+          <p:cNvSpPr>
+            <a:spLocks noGrp="1"/>
+          </p:cNvSpPr>
+          <p:nvPr>
+            <p:ph type="title"/>
+          </p:nvPr>
+        </p:nvSpPr>
+        <p:spPr/>
+        <p:txBody>
+          <a:bodyPr/>
+          <a:lstStyle/>
+          <a:p>
+            <a:r>
+              <a:rPr lang="en-US" dirty="0" smtClean="0"/>
+              <a:t>Summary and Takeaways</a:t>
+            </a:r>
+            <a:endParaRPr lang="en-US" dirty="0"/>
+          </a:p>
+        </p:txBody>
+      </p:sp>
+      <p:sp>
+        <p:nvSpPr>
+          <p:cNvPr id="3" name="Content Placeholder 2"/>
+          <p:cNvSpPr>
+            <a:spLocks noGrp="1"/>
+          </p:cNvSpPr>
+          <p:nvPr>
+            <p:ph idx="1"/>
+          </p:nvPr>
+        </p:nvSpPr>
+        <p:spPr/>
+        <p:txBody>
+          <a:bodyPr/>
+          <a:lstStyle/>
+          <a:p>
+            <a:r>
+              <a:rPr lang="en-US" dirty="0" smtClean="0"/>
+              <a:t>Robots are fragile</a:t>
+            </a:r>
+          </a:p>
+          <a:p>
+            <a:r>
+              <a:rPr lang="en-US" dirty="0" smtClean="0"/>
+              <a:t>Sprint schedule was very compacted</a:t>
+            </a:r>
+          </a:p>
+          <a:p>
+            <a:r>
+              <a:rPr lang="en-US" dirty="0" smtClean="0"/>
+              <a:t>Improve Work Efficiency</a:t>
+            </a:r>
+          </a:p>
+          <a:p>
+            <a:pPr lvl="1"/>
+            <a:r>
+              <a:rPr lang="en-US" dirty="0" smtClean="0"/>
+              <a:t>Based on 3 hours per lesson, 81% Efficiency</a:t>
+            </a:r>
+          </a:p>
+          <a:p>
+            <a:pPr lvl="1"/>
+            <a:r>
+              <a:rPr lang="en-US" dirty="0" smtClean="0"/>
+              <a:t>More Even </a:t>
+            </a:r>
+            <a:r>
+              <a:rPr lang="en-US" dirty="0" smtClean="0"/>
+              <a:t>Workload</a:t>
+            </a:r>
+          </a:p>
+          <a:p>
+            <a:r>
+              <a:rPr lang="en-US" dirty="0" smtClean="0"/>
+              <a:t>Improve Communication from some people…</a:t>
+            </a:r>
+            <a:endParaRPr lang="en-US" dirty="0" smtClean="0"/>
+          </a:p>
+          <a:p>
+            <a:endParaRPr lang="en-US" dirty="0"/>
+          </a:p>
+        </p:txBody>
+      </p:sp>
+    </p:spTree>
+    <p:extLst>
+      <p:ext uri="{BB962C8B-B14F-4D97-AF65-F5344CB8AC3E}">
+        <p14:creationId xmlns:p14="http://schemas.microsoft.com/office/powerpoint/2010/main" val="138357413"/>
+      </p:ext>
+    </p:extLst>
+  </p:cSld>
+  <p:clrMapOvr>
+    <a:masterClrMapping/>
+  </p:clrMapOvr>
+</p:sld>
+</file>
+
+<file path=ppt/slides/slide16.xml><?xml version="1.0" encoding="utf-8"?>
+<p:sld xmlns:a="http://schemas.openxmlformats.org/drawingml/2006/main" xmlns:r="http://schemas.openxmlformats.org/officeDocument/2006/relationships" xmlns:p="http://schemas.openxmlformats.org/presentationml/2006/main">
+  <p:cSld>
+    <p:spTree>
+      <p:nvGrpSpPr>
+        <p:cNvPr id="1" name=""/>
+        <p:cNvGrpSpPr/>
+        <p:nvPr/>
+      </p:nvGrpSpPr>
+      <p:grpSpPr>
+        <a:xfrm>
+          <a:off x="0" y="0"/>
+          <a:ext cx="0" cy="0"/>
+          <a:chOff x="0" y="0"/>
+          <a:chExt cx="0" cy="0"/>
+        </a:xfrm>
+      </p:grpSpPr>
+      <p:sp>
+        <p:nvSpPr>
+          <p:cNvPr id="2" name="Title 1"/>
+          <p:cNvSpPr>
+            <a:spLocks noGrp="1"/>
+          </p:cNvSpPr>
+          <p:nvPr>
+            <p:ph type="title"/>
+          </p:nvPr>
+        </p:nvSpPr>
+        <p:spPr/>
+        <p:txBody>
+          <a:bodyPr/>
+          <a:lstStyle/>
+          <a:p>
+            <a:r>
+              <a:rPr lang="en-US" dirty="0" smtClean="0"/>
+              <a:t>Documentation</a:t>
+            </a:r>
+            <a:endParaRPr lang="en-US" dirty="0"/>
+          </a:p>
+        </p:txBody>
+      </p:sp>
+      <p:sp>
+        <p:nvSpPr>
+          <p:cNvPr id="3" name="Content Placeholder 2"/>
+          <p:cNvSpPr>
+            <a:spLocks noGrp="1"/>
+          </p:cNvSpPr>
+          <p:nvPr>
+            <p:ph idx="1"/>
+          </p:nvPr>
+        </p:nvSpPr>
+        <p:spPr/>
+        <p:txBody>
+          <a:bodyPr/>
+          <a:lstStyle/>
+          <a:p>
+            <a:r>
+              <a:rPr lang="en-US" dirty="0" smtClean="0"/>
+              <a:t>None.</a:t>
+            </a:r>
+            <a:endParaRPr lang="en-US" dirty="0"/>
+          </a:p>
+        </p:txBody>
+      </p:sp>
+    </p:spTree>
+    <p:extLst>
+      <p:ext uri="{BB962C8B-B14F-4D97-AF65-F5344CB8AC3E}">
+        <p14:creationId xmlns:p14="http://schemas.microsoft.com/office/powerpoint/2010/main" val="1578546148"/>
+      </p:ext>
+    </p:extLst>
+  </p:cSld>
+  <p:clrMapOvr>
+    <a:masterClrMapping/>
+  </p:clrMapOvr>
+</p:sld>
+</file>
+
+<file path=ppt/slides/slide17.xml><?xml version="1.0" encoding="utf-8"?>
+<p:sld xmlns:a="http://schemas.openxmlformats.org/drawingml/2006/main" xmlns:r="http://schemas.openxmlformats.org/officeDocument/2006/relationships" xmlns:p="http://schemas.openxmlformats.org/presentationml/2006/main">
+  <p:cSld>
+    <p:spTree>
+      <p:nvGrpSpPr>
+        <p:cNvPr id="1" name=""/>
+        <p:cNvGrpSpPr/>
+        <p:nvPr/>
+      </p:nvGrpSpPr>
+      <p:grpSpPr>
+        <a:xfrm>
+          <a:off x="0" y="0"/>
+          <a:ext cx="0" cy="0"/>
+          <a:chOff x="0" y="0"/>
+          <a:chExt cx="0" cy="0"/>
+        </a:xfrm>
+      </p:grpSpPr>
+      <p:sp>
+        <p:nvSpPr>
+          <p:cNvPr id="2" name="Title 1"/>
+          <p:cNvSpPr>
+            <a:spLocks noGrp="1"/>
+          </p:cNvSpPr>
+          <p:nvPr>
+            <p:ph type="title"/>
+          </p:nvPr>
+        </p:nvSpPr>
+        <p:spPr/>
+        <p:txBody>
+          <a:bodyPr/>
+          <a:lstStyle/>
+          <a:p>
+            <a:r>
+              <a:rPr lang="en-US" dirty="0" smtClean="0"/>
+              <a:t>Questions?</a:t>
+            </a:r>
+            <a:endParaRPr lang="en-US" dirty="0"/>
+          </a:p>
+        </p:txBody>
+      </p:sp>
+      <p:sp>
+        <p:nvSpPr>
+          <p:cNvPr id="3" name="Content Placeholder 2"/>
+          <p:cNvSpPr>
+            <a:spLocks noGrp="1"/>
+          </p:cNvSpPr>
+          <p:nvPr>
+            <p:ph idx="1"/>
+          </p:nvPr>
+        </p:nvSpPr>
+        <p:spPr/>
+        <p:txBody>
+          <a:bodyPr/>
+          <a:lstStyle/>
+          <a:p>
+            <a:endParaRPr lang="en-US"/>
+          </a:p>
+        </p:txBody>
+      </p:sp>
+    </p:spTree>
+    <p:extLst>
+      <p:ext uri="{BB962C8B-B14F-4D97-AF65-F5344CB8AC3E}">
+        <p14:creationId xmlns:p14="http://schemas.microsoft.com/office/powerpoint/2010/main" val="3565531884"/>
+      </p:ext>
+    </p:extLst>
+  </p:cSld>
+  <p:clrMapOvr>
+    <a:masterClrMapping/>
+  </p:clrMapOvr>
+</p:sld>
+</file>
+
+<file path=ppt/slides/slide2.xml><?xml version="1.0" encoding="utf-8"?>
+<p:sld xmlns:a="http://schemas.openxmlformats.org/drawingml/2006/main" xmlns:r="http://schemas.openxmlformats.org/officeDocument/2006/relationships" xmlns:p="http://schemas.openxmlformats.org/presentationml/2006/main">
+  <p:cSld>
+    <p:spTree>
+      <p:nvGrpSpPr>
+        <p:cNvPr id="1" name=""/>
+        <p:cNvGrpSpPr/>
+        <p:nvPr/>
+      </p:nvGrpSpPr>
+      <p:grpSpPr>
+        <a:xfrm>
+          <a:off x="0" y="0"/>
+          <a:ext cx="0" cy="0"/>
+          <a:chOff x="0" y="0"/>
+          <a:chExt cx="0" cy="0"/>
+        </a:xfrm>
+      </p:grpSpPr>
+      <p:sp>
+        <p:nvSpPr>
+          <p:cNvPr id="2" name="Title 1"/>
+          <p:cNvSpPr>
+            <a:spLocks noGrp="1"/>
+          </p:cNvSpPr>
+          <p:nvPr>
+            <p:ph type="title"/>
+          </p:nvPr>
+        </p:nvSpPr>
+        <p:spPr/>
+        <p:txBody>
+          <a:bodyPr>
+            <a:normAutofit fontScale="90000"/>
+          </a:bodyPr>
+          <a:lstStyle/>
+          <a:p>
+            <a:r>
+              <a:rPr lang="en-US" dirty="0" smtClean="0"/>
+              <a:t>Sprint 1 Retrospective Meeting</a:t>
+            </a:r>
+            <a:endParaRPr lang="en-US" dirty="0"/>
+          </a:p>
+        </p:txBody>
+      </p:sp>
+      <p:sp>
+        <p:nvSpPr>
+          <p:cNvPr id="3" name="Content Placeholder 2"/>
+          <p:cNvSpPr>
+            <a:spLocks noGrp="1"/>
+          </p:cNvSpPr>
+          <p:nvPr>
+            <p:ph idx="1"/>
+          </p:nvPr>
+        </p:nvSpPr>
+        <p:spPr/>
+        <p:txBody>
+          <a:bodyPr/>
+          <a:lstStyle/>
+          <a:p>
+            <a:r>
+              <a:rPr lang="en-US" dirty="0" smtClean="0"/>
+              <a:t>Need to make better use of Scrum</a:t>
+            </a:r>
+          </a:p>
+          <a:p>
+            <a:r>
+              <a:rPr lang="en-US" dirty="0" smtClean="0"/>
+              <a:t>Gained hours of familiarity with Nao System</a:t>
+            </a:r>
+          </a:p>
+          <a:p>
+            <a:r>
+              <a:rPr lang="en-US" dirty="0" smtClean="0"/>
+              <a:t>Good distribution of Work</a:t>
+            </a:r>
+          </a:p>
+          <a:p>
+            <a:r>
+              <a:rPr lang="en-US" dirty="0" smtClean="0"/>
+              <a:t>Use a combined demo in future</a:t>
+            </a:r>
+          </a:p>
+          <a:p>
+            <a:r>
+              <a:rPr lang="en-US" dirty="0" smtClean="0"/>
+              <a:t>Need better hour tracking</a:t>
+            </a:r>
+            <a:endParaRPr lang="en-US" dirty="0"/>
+          </a:p>
+        </p:txBody>
+      </p:sp>
+    </p:spTree>
+    <p:extLst>
+      <p:ext uri="{BB962C8B-B14F-4D97-AF65-F5344CB8AC3E}">
+        <p14:creationId xmlns:p14="http://schemas.microsoft.com/office/powerpoint/2010/main" val="1694226758"/>
+      </p:ext>
+    </p:extLst>
+  </p:cSld>
+  <p:clrMapOvr>
+    <a:masterClrMapping/>
+  </p:clrMapOvr>
+</p:sld>
+</file>
+
+<file path=ppt/slides/slide3.xml><?xml version="1.0" encoding="utf-8"?>
+<p:sld xmlns:a="http://schemas.openxmlformats.org/drawingml/2006/main" xmlns:r="http://schemas.openxmlformats.org/officeDocument/2006/relationships" xmlns:p="http://schemas.openxmlformats.org/presentationml/2006/main">
+  <p:cSld>
+    <p:spTree>
+      <p:nvGrpSpPr>
+        <p:cNvPr id="1" name=""/>
+        <p:cNvGrpSpPr/>
+        <p:nvPr/>
+      </p:nvGrpSpPr>
+      <p:grpSpPr>
+        <a:xfrm>
+          <a:off x="0" y="0"/>
+          <a:ext cx="0" cy="0"/>
+          <a:chOff x="0" y="0"/>
+          <a:chExt cx="0" cy="0"/>
+        </a:xfrm>
+      </p:grpSpPr>
+      <p:sp>
+        <p:nvSpPr>
+          <p:cNvPr id="2" name="Title 1"/>
+          <p:cNvSpPr>
+            <a:spLocks noGrp="1"/>
+          </p:cNvSpPr>
+          <p:nvPr>
+            <p:ph type="title"/>
+          </p:nvPr>
+        </p:nvSpPr>
+        <p:spPr/>
+        <p:txBody>
+          <a:bodyPr/>
+          <a:lstStyle/>
+          <a:p>
+            <a:r>
+              <a:rPr lang="en-US" dirty="0" smtClean="0"/>
+              <a:t>Sprint 2 Backlog Items</a:t>
+            </a:r>
+            <a:endParaRPr lang="en-US" dirty="0"/>
+          </a:p>
+        </p:txBody>
+      </p:sp>
+      <p:sp>
+        <p:nvSpPr>
+          <p:cNvPr id="3" name="Content Placeholder 2"/>
+          <p:cNvSpPr>
+            <a:spLocks noGrp="1"/>
+          </p:cNvSpPr>
+          <p:nvPr>
+            <p:ph idx="1"/>
+          </p:nvPr>
+        </p:nvSpPr>
+        <p:spPr>
+          <a:xfrm>
+            <a:off x="1043492" y="2323652"/>
+            <a:ext cx="6777317" cy="4000948"/>
+          </a:xfrm>
+        </p:spPr>
+        <p:txBody>
+          <a:bodyPr>
+            <a:normAutofit fontScale="62500" lnSpcReduction="20000"/>
+          </a:bodyPr>
+          <a:lstStyle/>
+          <a:p>
+            <a:r>
+              <a:rPr lang="en-US" dirty="0"/>
+              <a:t>As a K-5 Educator, I need the NAO to play fun games with my students where they practice determining which of two numbers is larger so that they will be motivated to develop and practice their number understanding of numeric ordering</a:t>
+            </a:r>
+            <a:r>
+              <a:rPr lang="en-US" dirty="0" smtClean="0"/>
+              <a:t>.</a:t>
+            </a:r>
+          </a:p>
+          <a:p>
+            <a:r>
+              <a:rPr lang="en-US" dirty="0"/>
+              <a:t>As a K-5 STEM Supporter, I need the NAO to engage with my students in activities and demos that would encourage their interests in STEM studies and careers so that they will be excited, motivated, and not intimidated to further their studies in STEM subjects to include computer science and robotics</a:t>
+            </a:r>
+            <a:r>
+              <a:rPr lang="en-US" dirty="0" smtClean="0"/>
+              <a:t>.</a:t>
+            </a:r>
+          </a:p>
+          <a:p>
+            <a:r>
+              <a:rPr lang="en-US" dirty="0"/>
+              <a:t>As a STEM Supporter, I need the NAO to play the High-Low game with students in an age-appropriate conversational manner (K-5, 6-8, 9-12) to help develop number understanding and algorithmic reasoning skills (bisection searching) so that the students are motivated for further studies of computer science</a:t>
+            </a:r>
+            <a:r>
+              <a:rPr lang="en-US" dirty="0" smtClean="0"/>
+              <a:t>.</a:t>
+            </a:r>
+          </a:p>
+          <a:p>
+            <a:r>
+              <a:rPr lang="en-US" dirty="0"/>
+              <a:t>As a STEM Supporter, I need the NAO to play the Rock-Paper-Scissors game with students in an age-appropriate conversational manner (K-5, 6-8, 9-12) so that the students are motivated for further studies of computer science</a:t>
+            </a:r>
+            <a:r>
+              <a:rPr lang="en-US" dirty="0" smtClean="0"/>
+              <a:t>.</a:t>
+            </a:r>
+          </a:p>
+        </p:txBody>
+      </p:sp>
+    </p:spTree>
+    <p:extLst>
+      <p:ext uri="{BB962C8B-B14F-4D97-AF65-F5344CB8AC3E}">
+        <p14:creationId xmlns:p14="http://schemas.microsoft.com/office/powerpoint/2010/main" val="529475742"/>
+      </p:ext>
+    </p:extLst>
+  </p:cSld>
+  <p:clrMapOvr>
+    <a:masterClrMapping/>
+  </p:clrMapOvr>
+</p:sld>
+</file>
+
+<file path=ppt/slides/slide4.xml><?xml version="1.0" encoding="utf-8"?>
+<p:sld xmlns:a="http://schemas.openxmlformats.org/drawingml/2006/main" xmlns:r="http://schemas.openxmlformats.org/officeDocument/2006/relationships" xmlns:p="http://schemas.openxmlformats.org/presentationml/2006/main">
+  <p:cSld>
+    <p:spTree>
+      <p:nvGrpSpPr>
+        <p:cNvPr id="1" name=""/>
+        <p:cNvGrpSpPr/>
+        <p:nvPr/>
+      </p:nvGrpSpPr>
+      <p:grpSpPr>
+        <a:xfrm>
+          <a:off x="0" y="0"/>
+          <a:ext cx="0" cy="0"/>
+          <a:chOff x="0" y="0"/>
+          <a:chExt cx="0" cy="0"/>
+        </a:xfrm>
+      </p:grpSpPr>
+      <p:sp>
+        <p:nvSpPr>
+          <p:cNvPr id="2" name="Title 1"/>
+          <p:cNvSpPr>
+            <a:spLocks noGrp="1"/>
+          </p:cNvSpPr>
+          <p:nvPr>
+            <p:ph type="title"/>
+          </p:nvPr>
+        </p:nvSpPr>
+        <p:spPr>
+          <a:xfrm>
+            <a:off x="1043490" y="1027664"/>
+            <a:ext cx="7414710" cy="1143000"/>
+          </a:xfrm>
+        </p:spPr>
+        <p:txBody>
+          <a:bodyPr>
+            <a:normAutofit/>
+          </a:bodyPr>
+          <a:lstStyle/>
+          <a:p>
+            <a:r>
+              <a:rPr lang="en-US" dirty="0"/>
+              <a:t>Sprint 2 Backlog </a:t>
+            </a:r>
+            <a:r>
+              <a:rPr lang="en-US" dirty="0" smtClean="0"/>
+              <a:t>Items (Cont.)</a:t>
+            </a:r>
+            <a:endParaRPr lang="en-US" dirty="0"/>
+          </a:p>
+        </p:txBody>
+      </p:sp>
+      <p:sp>
+        <p:nvSpPr>
+          <p:cNvPr id="3" name="Content Placeholder 2"/>
+          <p:cNvSpPr>
+            <a:spLocks noGrp="1"/>
+          </p:cNvSpPr>
+          <p:nvPr>
+            <p:ph idx="1"/>
+          </p:nvPr>
+        </p:nvSpPr>
+        <p:spPr>
+          <a:xfrm>
+            <a:off x="1043492" y="2323652"/>
+            <a:ext cx="6777317" cy="4000948"/>
+          </a:xfrm>
+        </p:spPr>
+        <p:txBody>
+          <a:bodyPr>
+            <a:normAutofit fontScale="62500" lnSpcReduction="20000"/>
+          </a:bodyPr>
+          <a:lstStyle/>
+          <a:p>
+            <a:r>
+              <a:rPr lang="en-US" dirty="0"/>
+              <a:t>As a Developer for the NAO, I need the NAO to perform animated emotional responses (with or without speaking) to indicate surprise, thinking/pondering, happy, sad, excited, 'whatever' attitude, '</a:t>
+            </a:r>
+            <a:r>
+              <a:rPr lang="en-US" dirty="0" err="1"/>
+              <a:t>What'z</a:t>
+            </a:r>
+            <a:r>
+              <a:rPr lang="en-US" dirty="0"/>
+              <a:t> up?', and other similar emotions.</a:t>
+            </a:r>
+          </a:p>
+          <a:p>
+            <a:r>
+              <a:rPr lang="en-US" dirty="0"/>
+              <a:t>As a Special Needs K-5 Educator, I need the NAO to say (in an animated manner), "Uh, I am upset right now.  May I have a break, please" so that the student will understand that it is okay to feel upset and ask for a break.</a:t>
+            </a:r>
+          </a:p>
+          <a:p>
+            <a:r>
+              <a:rPr lang="en-US" dirty="0"/>
+              <a:t>As a Computer Scientist, I need the NAO to demonstrate Isaac Asimov's Three Laws of </a:t>
+            </a:r>
+            <a:r>
+              <a:rPr lang="en-US" dirty="0" err="1"/>
+              <a:t>Robtics</a:t>
+            </a:r>
+            <a:r>
+              <a:rPr lang="en-US" dirty="0"/>
+              <a:t> (No Harming Humans, Do What They Are Told, Self-Preservation - where each is trumped by the previous) so that we can demonstrate the laws to others and explore how such a hierarchy of priorities might be implemented.</a:t>
+            </a:r>
+          </a:p>
+          <a:p>
+            <a:r>
+              <a:rPr lang="en-US" b="1" dirty="0"/>
+              <a:t>As a STEM Outreach Educator, I need the NAO to have a repository of </a:t>
+            </a:r>
+            <a:r>
+              <a:rPr lang="en-US" b="1" dirty="0" err="1"/>
+              <a:t>Choregraphe</a:t>
+            </a:r>
+            <a:r>
+              <a:rPr lang="en-US" b="1" dirty="0"/>
+              <a:t> modules that can be used by K-5 students to program the NAOs to tell stories of their creation so that I can teach the students some basic programming skills to include sequential, conditional, and iterative logic, concurrency and synchronization, and data storage and retrieval.</a:t>
+            </a:r>
+          </a:p>
+          <a:p>
+            <a:endParaRPr lang="en-US" dirty="0"/>
+          </a:p>
+        </p:txBody>
+      </p:sp>
+    </p:spTree>
+    <p:extLst>
+      <p:ext uri="{BB962C8B-B14F-4D97-AF65-F5344CB8AC3E}">
+        <p14:creationId xmlns:p14="http://schemas.microsoft.com/office/powerpoint/2010/main" val="3448144766"/>
+      </p:ext>
+    </p:extLst>
+  </p:cSld>
+  <p:clrMapOvr>
+    <a:masterClrMapping/>
+  </p:clrMapOvr>
+</p:sld>
+</file>
+
+<file path=ppt/slides/slide5.xml><?xml version="1.0" encoding="utf-8"?>
+<p:sld xmlns:a="http://schemas.openxmlformats.org/drawingml/2006/main" xmlns:r="http://schemas.openxmlformats.org/officeDocument/2006/relationships" xmlns:p="http://schemas.openxmlformats.org/presentationml/2006/main">
+  <p:cSld>
+    <p:spTree>
+      <p:nvGrpSpPr>
+        <p:cNvPr id="1" name=""/>
+        <p:cNvGrpSpPr/>
+        <p:nvPr/>
+      </p:nvGrpSpPr>
+      <p:grpSpPr>
+        <a:xfrm>
+          <a:off x="0" y="0"/>
+          <a:ext cx="0" cy="0"/>
+          <a:chOff x="0" y="0"/>
+          <a:chExt cx="0" cy="0"/>
+        </a:xfrm>
+      </p:grpSpPr>
+      <p:sp>
+        <p:nvSpPr>
+          <p:cNvPr id="2" name="Title 1"/>
+          <p:cNvSpPr>
+            <a:spLocks noGrp="1"/>
+          </p:cNvSpPr>
+          <p:nvPr>
+            <p:ph type="title"/>
+          </p:nvPr>
+        </p:nvSpPr>
+        <p:spPr/>
+        <p:txBody>
+          <a:bodyPr/>
+          <a:lstStyle/>
+          <a:p>
+            <a:r>
+              <a:rPr lang="en-US" dirty="0" smtClean="0"/>
+              <a:t>Sprint 2 </a:t>
+            </a:r>
+            <a:r>
+              <a:rPr lang="en-US" dirty="0" smtClean="0"/>
+              <a:t>Tasks</a:t>
+            </a:r>
+            <a:r>
+              <a:rPr lang="en-US" dirty="0" smtClean="0"/>
+              <a:t>	</a:t>
+            </a:r>
+            <a:endParaRPr lang="en-US" dirty="0"/>
+          </a:p>
+        </p:txBody>
+      </p:sp>
+      <p:sp>
+        <p:nvSpPr>
+          <p:cNvPr id="3" name="Content Placeholder 2"/>
+          <p:cNvSpPr>
+            <a:spLocks noGrp="1"/>
+          </p:cNvSpPr>
+          <p:nvPr>
+            <p:ph idx="1"/>
+          </p:nvPr>
+        </p:nvSpPr>
+        <p:spPr/>
+        <p:txBody>
+          <a:bodyPr>
+            <a:normAutofit lnSpcReduction="10000"/>
+          </a:bodyPr>
+          <a:lstStyle/>
+          <a:p>
+            <a:r>
+              <a:rPr lang="en-US" dirty="0" smtClean="0"/>
+              <a:t>Finish Rock-Paper-Scissors</a:t>
+            </a:r>
+          </a:p>
+          <a:p>
+            <a:pPr lvl="1"/>
+            <a:r>
+              <a:rPr lang="en-US" dirty="0" smtClean="0"/>
+              <a:t>Fix Choices (2 </a:t>
+            </a:r>
+            <a:r>
+              <a:rPr lang="en-US" dirty="0" err="1" smtClean="0"/>
+              <a:t>hr</a:t>
+            </a:r>
+            <a:r>
+              <a:rPr lang="en-US" dirty="0" smtClean="0"/>
+              <a:t>)</a:t>
+            </a:r>
+          </a:p>
+          <a:p>
+            <a:pPr lvl="1"/>
+            <a:r>
+              <a:rPr lang="en-US" dirty="0" smtClean="0"/>
+              <a:t>Add extra animations (4 </a:t>
+            </a:r>
+            <a:r>
+              <a:rPr lang="en-US" dirty="0" err="1" smtClean="0"/>
+              <a:t>hr</a:t>
+            </a:r>
+            <a:r>
+              <a:rPr lang="en-US" dirty="0" smtClean="0"/>
+              <a:t>)</a:t>
+            </a:r>
+          </a:p>
+          <a:p>
+            <a:pPr lvl="1"/>
+            <a:r>
+              <a:rPr lang="en-US" dirty="0" smtClean="0"/>
+              <a:t>Beta Testing (2 </a:t>
+            </a:r>
+            <a:r>
+              <a:rPr lang="en-US" dirty="0" err="1" smtClean="0"/>
+              <a:t>hr</a:t>
+            </a:r>
+            <a:r>
+              <a:rPr lang="en-US" dirty="0" smtClean="0"/>
+              <a:t>)</a:t>
+            </a:r>
+            <a:endParaRPr lang="en-US" dirty="0"/>
+          </a:p>
+          <a:p>
+            <a:r>
+              <a:rPr lang="en-US" dirty="0" smtClean="0"/>
+              <a:t>Fix access to code repository</a:t>
+            </a:r>
+            <a:r>
+              <a:rPr lang="en-US" dirty="0"/>
+              <a:t> </a:t>
+            </a:r>
+            <a:r>
+              <a:rPr lang="en-US" dirty="0" smtClean="0"/>
+              <a:t>(30 min)</a:t>
+            </a:r>
+          </a:p>
+          <a:p>
+            <a:r>
+              <a:rPr lang="en-US" dirty="0" smtClean="0"/>
+              <a:t>Sprint Review Prep</a:t>
+            </a:r>
+          </a:p>
+          <a:p>
+            <a:pPr lvl="1"/>
+            <a:r>
+              <a:rPr lang="en-US" dirty="0" smtClean="0"/>
+              <a:t>Demo (2 </a:t>
+            </a:r>
+            <a:r>
+              <a:rPr lang="en-US" dirty="0" err="1" smtClean="0"/>
+              <a:t>hr</a:t>
+            </a:r>
+            <a:r>
+              <a:rPr lang="en-US" dirty="0" smtClean="0"/>
+              <a:t>)</a:t>
+            </a:r>
+          </a:p>
+          <a:p>
+            <a:pPr lvl="1"/>
+            <a:r>
+              <a:rPr lang="en-US" dirty="0" smtClean="0"/>
+              <a:t>Presentation (2 </a:t>
+            </a:r>
+            <a:r>
+              <a:rPr lang="en-US" dirty="0" err="1" smtClean="0"/>
+              <a:t>hr</a:t>
+            </a:r>
+            <a:r>
+              <a:rPr lang="en-US" dirty="0" smtClean="0"/>
+              <a:t>)</a:t>
+            </a:r>
+          </a:p>
+          <a:p>
+            <a:pPr lvl="1"/>
+            <a:r>
+              <a:rPr lang="en-US" dirty="0" smtClean="0"/>
+              <a:t>Admin Framework (3 </a:t>
+            </a:r>
+            <a:r>
+              <a:rPr lang="en-US" dirty="0" err="1" smtClean="0"/>
+              <a:t>hr</a:t>
+            </a:r>
+            <a:r>
+              <a:rPr lang="en-US" dirty="0" smtClean="0"/>
+              <a:t>)</a:t>
+            </a:r>
+          </a:p>
+        </p:txBody>
+      </p:sp>
+    </p:spTree>
+    <p:extLst>
+      <p:ext uri="{BB962C8B-B14F-4D97-AF65-F5344CB8AC3E}">
+        <p14:creationId xmlns:p14="http://schemas.microsoft.com/office/powerpoint/2010/main" val="3954483666"/>
+      </p:ext>
+    </p:extLst>
+  </p:cSld>
+  <p:clrMapOvr>
+    <a:masterClrMapping/>
+  </p:clrMapOvr>
+</p:sld>
+</file>
+
+<file path=ppt/slides/slide6.xml><?xml version="1.0" encoding="utf-8"?>
+<p:sld xmlns:a="http://schemas.openxmlformats.org/drawingml/2006/main" xmlns:r="http://schemas.openxmlformats.org/officeDocument/2006/relationships" xmlns:p="http://schemas.openxmlformats.org/presentationml/2006/main">
+  <p:cSld>
+    <p:spTree>
+      <p:nvGrpSpPr>
+        <p:cNvPr id="1" name=""/>
+        <p:cNvGrpSpPr/>
+        <p:nvPr/>
+      </p:nvGrpSpPr>
+      <p:grpSpPr>
+        <a:xfrm>
+          <a:off x="0" y="0"/>
+          <a:ext cx="0" cy="0"/>
+          <a:chOff x="0" y="0"/>
+          <a:chExt cx="0" cy="0"/>
+        </a:xfrm>
+      </p:grpSpPr>
+      <p:sp>
+        <p:nvSpPr>
+          <p:cNvPr id="2" name="Title 1"/>
+          <p:cNvSpPr>
+            <a:spLocks noGrp="1"/>
+          </p:cNvSpPr>
+          <p:nvPr>
+            <p:ph type="title"/>
+          </p:nvPr>
+        </p:nvSpPr>
+        <p:spPr>
+          <a:xfrm>
+            <a:off x="1043490" y="1027664"/>
+            <a:ext cx="7490910" cy="1143000"/>
+          </a:xfrm>
+        </p:spPr>
+        <p:txBody>
+          <a:bodyPr>
+            <a:normAutofit/>
+          </a:bodyPr>
+          <a:lstStyle/>
+          <a:p>
+            <a:r>
+              <a:rPr lang="en-US" dirty="0" smtClean="0"/>
+              <a:t>Sprint 2 </a:t>
+            </a:r>
+            <a:r>
+              <a:rPr lang="en-US" dirty="0" smtClean="0"/>
+              <a:t>Tasks </a:t>
+            </a:r>
+            <a:r>
+              <a:rPr lang="en-US" dirty="0" smtClean="0"/>
+              <a:t>(Cont.)</a:t>
+            </a:r>
+            <a:endParaRPr lang="en-US" dirty="0"/>
+          </a:p>
+        </p:txBody>
+      </p:sp>
+      <p:sp>
+        <p:nvSpPr>
+          <p:cNvPr id="3" name="Content Placeholder 2"/>
+          <p:cNvSpPr>
+            <a:spLocks noGrp="1"/>
+          </p:cNvSpPr>
+          <p:nvPr>
+            <p:ph idx="1"/>
+          </p:nvPr>
+        </p:nvSpPr>
+        <p:spPr/>
+        <p:txBody>
+          <a:bodyPr>
+            <a:normAutofit fontScale="92500" lnSpcReduction="10000"/>
+          </a:bodyPr>
+          <a:lstStyle/>
+          <a:p>
+            <a:r>
+              <a:rPr lang="en-US" dirty="0" smtClean="0"/>
+              <a:t>Finish High-Low</a:t>
+            </a:r>
+          </a:p>
+          <a:p>
+            <a:pPr lvl="1"/>
+            <a:r>
+              <a:rPr lang="en-US" dirty="0" smtClean="0"/>
+              <a:t>Code Exploration (6 </a:t>
+            </a:r>
+            <a:r>
+              <a:rPr lang="en-US" dirty="0" err="1" smtClean="0"/>
+              <a:t>hr</a:t>
+            </a:r>
+            <a:r>
+              <a:rPr lang="en-US" dirty="0" smtClean="0"/>
+              <a:t>)</a:t>
+            </a:r>
+          </a:p>
+          <a:p>
+            <a:pPr lvl="1"/>
+            <a:r>
+              <a:rPr lang="en-US" dirty="0" smtClean="0"/>
+              <a:t>Beta Testing (2 </a:t>
+            </a:r>
+            <a:r>
+              <a:rPr lang="en-US" dirty="0" err="1" smtClean="0"/>
+              <a:t>hr</a:t>
+            </a:r>
+            <a:r>
+              <a:rPr lang="en-US" dirty="0" smtClean="0"/>
+              <a:t>)</a:t>
+            </a:r>
+          </a:p>
+          <a:p>
+            <a:pPr lvl="1"/>
+            <a:r>
+              <a:rPr lang="en-US" dirty="0" smtClean="0"/>
+              <a:t>Attitude Dialog (2 </a:t>
+            </a:r>
+            <a:r>
+              <a:rPr lang="en-US" dirty="0" err="1" smtClean="0"/>
+              <a:t>hr</a:t>
+            </a:r>
+            <a:r>
+              <a:rPr lang="en-US" dirty="0" smtClean="0"/>
+              <a:t>)</a:t>
+            </a:r>
+          </a:p>
+          <a:p>
+            <a:r>
+              <a:rPr lang="en-US" dirty="0" smtClean="0"/>
+              <a:t>Alter Star Wars Demo</a:t>
+            </a:r>
+          </a:p>
+          <a:p>
+            <a:pPr lvl="1"/>
+            <a:r>
+              <a:rPr lang="en-US" dirty="0" smtClean="0"/>
+              <a:t>Do not sit down at end (1 </a:t>
+            </a:r>
+            <a:r>
+              <a:rPr lang="en-US" dirty="0" err="1" smtClean="0"/>
+              <a:t>hr</a:t>
+            </a:r>
+            <a:r>
+              <a:rPr lang="en-US" dirty="0" smtClean="0"/>
+              <a:t>)</a:t>
+            </a:r>
+          </a:p>
+          <a:p>
+            <a:r>
+              <a:rPr lang="en-US" dirty="0" smtClean="0"/>
+              <a:t>Explore Capabilities</a:t>
+            </a:r>
+          </a:p>
+          <a:p>
+            <a:pPr lvl="1"/>
+            <a:r>
+              <a:rPr lang="en-US" dirty="0" smtClean="0"/>
+              <a:t>Range Finding (5 </a:t>
+            </a:r>
+            <a:r>
+              <a:rPr lang="en-US" dirty="0" err="1" smtClean="0"/>
+              <a:t>hr</a:t>
+            </a:r>
+            <a:r>
+              <a:rPr lang="en-US" dirty="0" smtClean="0"/>
+              <a:t>)</a:t>
+            </a:r>
+          </a:p>
+          <a:p>
+            <a:pPr lvl="1"/>
+            <a:r>
+              <a:rPr lang="en-US" dirty="0" smtClean="0"/>
+              <a:t>Facial Recognition (5 </a:t>
+            </a:r>
+            <a:r>
+              <a:rPr lang="en-US" dirty="0" err="1" smtClean="0"/>
+              <a:t>hr</a:t>
+            </a:r>
+            <a:r>
+              <a:rPr lang="en-US" dirty="0" smtClean="0"/>
+              <a:t>)</a:t>
+            </a:r>
+          </a:p>
+          <a:p>
+            <a:pPr lvl="1"/>
+            <a:r>
+              <a:rPr lang="en-US" dirty="0" smtClean="0"/>
+              <a:t>Support Asimov’s 3 Laws (5 </a:t>
+            </a:r>
+            <a:r>
+              <a:rPr lang="en-US" dirty="0" err="1" smtClean="0"/>
+              <a:t>hr</a:t>
+            </a:r>
+            <a:r>
+              <a:rPr lang="en-US" dirty="0" smtClean="0"/>
+              <a:t>)</a:t>
+            </a:r>
+          </a:p>
+        </p:txBody>
+      </p:sp>
+    </p:spTree>
+    <p:extLst>
+      <p:ext uri="{BB962C8B-B14F-4D97-AF65-F5344CB8AC3E}">
+        <p14:creationId xmlns:p14="http://schemas.microsoft.com/office/powerpoint/2010/main" val="936794108"/>
+      </p:ext>
+    </p:extLst>
+  </p:cSld>
+  <p:clrMapOvr>
+    <a:masterClrMapping/>
+  </p:clrMapOvr>
+</p:sld>
+</file>
+
+<file path=ppt/slides/slide7.xml><?xml version="1.0" encoding="utf-8"?>
+<p:sld xmlns:a="http://schemas.openxmlformats.org/drawingml/2006/main" xmlns:r="http://schemas.openxmlformats.org/officeDocument/2006/relationships" xmlns:p="http://schemas.openxmlformats.org/presentationml/2006/main">
+  <p:cSld>
+    <p:spTree>
+      <p:nvGrpSpPr>
+        <p:cNvPr id="1" name=""/>
+        <p:cNvGrpSpPr/>
+        <p:nvPr/>
+      </p:nvGrpSpPr>
+      <p:grpSpPr>
+        <a:xfrm>
+          <a:off x="0" y="0"/>
+          <a:ext cx="0" cy="0"/>
+          <a:chOff x="0" y="0"/>
+          <a:chExt cx="0" cy="0"/>
+        </a:xfrm>
+      </p:grpSpPr>
+      <p:sp>
+        <p:nvSpPr>
+          <p:cNvPr id="2" name="Title 1"/>
+          <p:cNvSpPr>
+            <a:spLocks noGrp="1"/>
+          </p:cNvSpPr>
+          <p:nvPr>
+            <p:ph type="title"/>
+          </p:nvPr>
+        </p:nvSpPr>
+        <p:spPr>
+          <a:xfrm>
+            <a:off x="1043490" y="1027664"/>
+            <a:ext cx="7414710" cy="1143000"/>
+          </a:xfrm>
+        </p:spPr>
+        <p:txBody>
+          <a:bodyPr>
+            <a:normAutofit/>
+          </a:bodyPr>
+          <a:lstStyle/>
+          <a:p>
+            <a:r>
+              <a:rPr lang="en-US" dirty="0" smtClean="0"/>
+              <a:t>Sprint 2 </a:t>
+            </a:r>
+            <a:r>
+              <a:rPr lang="en-US" dirty="0" smtClean="0"/>
+              <a:t>Tasks </a:t>
+            </a:r>
+            <a:r>
+              <a:rPr lang="en-US" dirty="0" smtClean="0"/>
+              <a:t>(Cont</a:t>
+            </a:r>
+            <a:r>
+              <a:rPr lang="en-US" dirty="0" smtClean="0"/>
+              <a:t>.)</a:t>
+            </a:r>
+            <a:endParaRPr lang="en-US" dirty="0"/>
+          </a:p>
+        </p:txBody>
+      </p:sp>
+      <p:sp>
+        <p:nvSpPr>
+          <p:cNvPr id="3" name="Content Placeholder 2"/>
+          <p:cNvSpPr>
+            <a:spLocks noGrp="1"/>
+          </p:cNvSpPr>
+          <p:nvPr>
+            <p:ph idx="1"/>
+          </p:nvPr>
+        </p:nvSpPr>
+        <p:spPr/>
+        <p:txBody>
+          <a:bodyPr>
+            <a:normAutofit lnSpcReduction="10000"/>
+          </a:bodyPr>
+          <a:lstStyle/>
+          <a:p>
+            <a:r>
+              <a:rPr lang="en-US" dirty="0" smtClean="0"/>
+              <a:t>K-5 Emotions Demo</a:t>
+            </a:r>
+          </a:p>
+          <a:p>
+            <a:pPr lvl="1"/>
+            <a:r>
+              <a:rPr lang="en-US" dirty="0" smtClean="0"/>
+              <a:t>“I’m tired, I need a break”</a:t>
+            </a:r>
+          </a:p>
+          <a:p>
+            <a:pPr lvl="1"/>
+            <a:r>
+              <a:rPr lang="en-US" dirty="0" smtClean="0"/>
+              <a:t>“I’m confused”</a:t>
+            </a:r>
+          </a:p>
+          <a:p>
+            <a:pPr lvl="1"/>
+            <a:r>
+              <a:rPr lang="en-US" dirty="0" smtClean="0"/>
+              <a:t>Perform in an animated manner (6 </a:t>
+            </a:r>
+            <a:r>
+              <a:rPr lang="en-US" dirty="0" err="1" smtClean="0"/>
+              <a:t>hr</a:t>
+            </a:r>
+            <a:r>
+              <a:rPr lang="en-US" dirty="0" smtClean="0"/>
+              <a:t>)</a:t>
+            </a:r>
+          </a:p>
+          <a:p>
+            <a:pPr lvl="1"/>
+            <a:r>
+              <a:rPr lang="en-US" dirty="0" smtClean="0"/>
+              <a:t>Add additional responses (4 </a:t>
+            </a:r>
+            <a:r>
+              <a:rPr lang="en-US" dirty="0" err="1" smtClean="0"/>
+              <a:t>hr</a:t>
+            </a:r>
+            <a:r>
+              <a:rPr lang="en-US" dirty="0" smtClean="0"/>
+              <a:t>)</a:t>
+            </a:r>
+          </a:p>
+          <a:p>
+            <a:pPr lvl="2"/>
+            <a:r>
+              <a:rPr lang="en-US" dirty="0" smtClean="0"/>
+              <a:t>Happy</a:t>
+            </a:r>
+          </a:p>
+          <a:p>
+            <a:pPr lvl="2"/>
+            <a:r>
+              <a:rPr lang="en-US" dirty="0" smtClean="0"/>
+              <a:t>Sad</a:t>
+            </a:r>
+          </a:p>
+          <a:p>
+            <a:pPr lvl="2"/>
+            <a:r>
+              <a:rPr lang="en-US" dirty="0" smtClean="0"/>
+              <a:t>Excited</a:t>
+            </a:r>
+          </a:p>
+          <a:p>
+            <a:pPr lvl="2"/>
+            <a:r>
+              <a:rPr lang="en-US" dirty="0" smtClean="0"/>
+              <a:t>“Whatever” (Indifference)</a:t>
+            </a:r>
+            <a:endParaRPr lang="en-US" dirty="0"/>
+          </a:p>
+        </p:txBody>
+      </p:sp>
+    </p:spTree>
+    <p:extLst>
+      <p:ext uri="{BB962C8B-B14F-4D97-AF65-F5344CB8AC3E}">
+        <p14:creationId xmlns:p14="http://schemas.microsoft.com/office/powerpoint/2010/main" val="849700090"/>
+      </p:ext>
+    </p:extLst>
+  </p:cSld>
+  <p:clrMapOvr>
+    <a:masterClrMapping/>
+  </p:clrMapOvr>
+</p:sld>
+</file>
+
+<file path=ppt/slides/slide8.xml><?xml version="1.0" encoding="utf-8"?>
+<p:sld xmlns:a="http://schemas.openxmlformats.org/drawingml/2006/main" xmlns:r="http://schemas.openxmlformats.org/officeDocument/2006/relationships" xmlns:p="http://schemas.openxmlformats.org/presentationml/2006/main">
+  <p:cSld>
+    <p:spTree>
+      <p:nvGrpSpPr>
+        <p:cNvPr id="1" name=""/>
+        <p:cNvGrpSpPr/>
+        <p:nvPr/>
+      </p:nvGrpSpPr>
+      <p:grpSpPr>
+        <a:xfrm>
+          <a:off x="0" y="0"/>
+          <a:ext cx="0" cy="0"/>
+          <a:chOff x="0" y="0"/>
+          <a:chExt cx="0" cy="0"/>
+        </a:xfrm>
+      </p:grpSpPr>
+      <p:sp>
+        <p:nvSpPr>
+          <p:cNvPr id="2" name="Title 1"/>
+          <p:cNvSpPr>
+            <a:spLocks noGrp="1"/>
+          </p:cNvSpPr>
+          <p:nvPr>
+            <p:ph type="title"/>
+          </p:nvPr>
+        </p:nvSpPr>
+        <p:spPr/>
+        <p:txBody>
+          <a:bodyPr/>
+          <a:lstStyle/>
+          <a:p>
+            <a:r>
+              <a:rPr lang="en-US" dirty="0" smtClean="0"/>
+              <a:t>Design Model</a:t>
+            </a:r>
+            <a:endParaRPr lang="en-US" dirty="0"/>
+          </a:p>
+        </p:txBody>
+      </p:sp>
+      <p:sp>
+        <p:nvSpPr>
+          <p:cNvPr id="3" name="Content Placeholder 2"/>
+          <p:cNvSpPr>
+            <a:spLocks noGrp="1"/>
+          </p:cNvSpPr>
+          <p:nvPr>
+            <p:ph idx="1"/>
+          </p:nvPr>
+        </p:nvSpPr>
+        <p:spPr/>
+        <p:txBody>
+          <a:bodyPr/>
+          <a:lstStyle/>
+          <a:p>
+            <a:r>
+              <a:rPr lang="en-US" dirty="0" smtClean="0"/>
+              <a:t>System architecture</a:t>
+            </a:r>
+          </a:p>
+          <a:p>
+            <a:pPr lvl="1"/>
+            <a:r>
+              <a:rPr lang="en-US" dirty="0" err="1" smtClean="0"/>
+              <a:t>Choregraphe</a:t>
+            </a:r>
+            <a:endParaRPr lang="en-US" dirty="0" smtClean="0"/>
+          </a:p>
+          <a:p>
+            <a:pPr lvl="1"/>
+            <a:r>
+              <a:rPr lang="en-US" dirty="0" smtClean="0"/>
+              <a:t>Nao Robot</a:t>
+            </a:r>
+            <a:endParaRPr lang="en-US" dirty="0" smtClean="0"/>
+          </a:p>
+        </p:txBody>
+      </p:sp>
+    </p:spTree>
+    <p:extLst>
+      <p:ext uri="{BB962C8B-B14F-4D97-AF65-F5344CB8AC3E}">
+        <p14:creationId xmlns:p14="http://schemas.microsoft.com/office/powerpoint/2010/main" val="2347316857"/>
+      </p:ext>
+    </p:extLst>
+  </p:cSld>
+  <p:clrMapOvr>
+    <a:masterClrMapping/>
+  </p:clrMapOvr>
+</p:sld>
+</file>
+
+<file path=ppt/slides/slide9.xml><?xml version="1.0" encoding="utf-8"?>
+<p:sld xmlns:a="http://schemas.openxmlformats.org/drawingml/2006/main" xmlns:r="http://schemas.openxmlformats.org/officeDocument/2006/relationships" xmlns:p="http://schemas.openxmlformats.org/presentationml/2006/main">
+  <p:cSld>
+    <p:spTree>
+      <p:nvGrpSpPr>
+        <p:cNvPr id="1" name=""/>
+        <p:cNvGrpSpPr/>
+        <p:nvPr/>
+      </p:nvGrpSpPr>
+      <p:grpSpPr>
+        <a:xfrm>
+          <a:off x="0" y="0"/>
+          <a:ext cx="0" cy="0"/>
+          <a:chOff x="0" y="0"/>
+          <a:chExt cx="0" cy="0"/>
+        </a:xfrm>
+      </p:grpSpPr>
+      <p:sp>
+        <p:nvSpPr>
+          <p:cNvPr id="2" name="Title 1"/>
+          <p:cNvSpPr>
+            <a:spLocks noGrp="1"/>
+          </p:cNvSpPr>
+          <p:nvPr>
+            <p:ph type="title"/>
+          </p:nvPr>
+        </p:nvSpPr>
+        <p:spPr>
+          <a:xfrm>
+            <a:off x="1043490" y="1027664"/>
+            <a:ext cx="7024744" cy="724936"/>
+          </a:xfrm>
+        </p:spPr>
+        <p:txBody>
+          <a:bodyPr/>
+          <a:lstStyle/>
+          <a:p>
+            <a:r>
+              <a:rPr lang="en-US" dirty="0" smtClean="0"/>
+              <a:t>Risks</a:t>
+            </a:r>
+            <a:endParaRPr lang="en-US" dirty="0"/>
+          </a:p>
+        </p:txBody>
+      </p:sp>
+      <p:sp>
+        <p:nvSpPr>
+          <p:cNvPr id="3" name="Content Placeholder 2"/>
+          <p:cNvSpPr>
+            <a:spLocks noGrp="1"/>
+          </p:cNvSpPr>
+          <p:nvPr>
+            <p:ph idx="1"/>
+          </p:nvPr>
+        </p:nvSpPr>
+        <p:spPr/>
+        <p:txBody>
+          <a:bodyPr/>
+          <a:lstStyle/>
+          <a:p>
+            <a:pPr marL="365760" lvl="1" indent="0">
+              <a:buNone/>
+            </a:pPr>
+            <a:endParaRPr lang="en-US" dirty="0"/>
+          </a:p>
+          <a:p>
+            <a:endParaRPr lang="en-US" dirty="0"/>
+          </a:p>
+        </p:txBody>
+      </p:sp>
+      <p:graphicFrame>
+        <p:nvGraphicFramePr>
+          <p:cNvPr id="4" name="Table 3"/>
+          <p:cNvGraphicFramePr>
+            <a:graphicFrameLocks noGrp="1"/>
+          </p:cNvGraphicFramePr>
+          <p:nvPr>
+            <p:extLst>
+              <p:ext uri="{D42A27DB-BD31-4B8C-83A1-F6EECF244321}">
+                <p14:modId xmlns:p14="http://schemas.microsoft.com/office/powerpoint/2010/main" val="318653209"/>
+              </p:ext>
+            </p:extLst>
+          </p:nvPr>
+        </p:nvGraphicFramePr>
+        <p:xfrm>
+          <a:off x="685800" y="1676400"/>
+          <a:ext cx="7696200" cy="4472940"/>
+        </p:xfrm>
+        <a:graphic>
+          <a:graphicData uri="http://schemas.openxmlformats.org/drawingml/2006/table">
+            <a:tbl>
+              <a:tblPr firstRow="1" bandRow="1">
+                <a:tableStyleId>{5C22544A-7EE6-4342-B048-85BDC9FD1C3A}</a:tableStyleId>
+              </a:tblPr>
+              <a:tblGrid>
+                <a:gridCol w="1924050"/>
+                <a:gridCol w="1924050"/>
+                <a:gridCol w="1924050"/>
+                <a:gridCol w="1924050"/>
+              </a:tblGrid>
+              <a:tr h="768701">
+                <a:tc>
+                  <a:txBody>
+                    <a:bodyPr/>
+                    <a:lstStyle/>
+                    <a:p>
+                      <a:r>
+                        <a:rPr lang="en-US" dirty="0" smtClean="0"/>
+                        <a:t>Risks</a:t>
+                      </a:r>
+                    </a:p>
+                  </a:txBody>
+                  <a:tcPr/>
+                </a:tc>
+                <a:tc>
+                  <a:txBody>
+                    <a:bodyPr/>
+                    <a:lstStyle/>
+                    <a:p>
+                      <a:r>
+                        <a:rPr lang="en-US" dirty="0" smtClean="0"/>
+                        <a:t>Likelihood</a:t>
+                      </a:r>
+                      <a:endParaRPr lang="en-US" dirty="0"/>
+                    </a:p>
+                  </a:txBody>
+                  <a:tcPr/>
+                </a:tc>
+                <a:tc>
+                  <a:txBody>
+                    <a:bodyPr/>
+                    <a:lstStyle/>
+                    <a:p>
+                      <a:r>
+                        <a:rPr lang="en-US" dirty="0" smtClean="0"/>
+                        <a:t>Impact</a:t>
+                      </a:r>
+                      <a:endParaRPr lang="en-US" dirty="0"/>
+                    </a:p>
+                  </a:txBody>
+                  <a:tcPr/>
+                </a:tc>
+                <a:tc>
+                  <a:txBody>
+                    <a:bodyPr/>
+                    <a:lstStyle/>
+                    <a:p>
+                      <a:r>
+                        <a:rPr lang="en-US" dirty="0" smtClean="0"/>
+                        <a:t>Mitigation</a:t>
+                      </a:r>
+                      <a:endParaRPr lang="en-US" dirty="0"/>
+                    </a:p>
+                  </a:txBody>
+                  <a:tcPr/>
+                </a:tc>
+              </a:tr>
+              <a:tr h="768701">
+                <a:tc>
+                  <a:txBody>
+                    <a:bodyPr/>
+                    <a:lstStyle/>
+                    <a:p>
+                      <a:r>
+                        <a:rPr lang="en-US" dirty="0" smtClean="0"/>
+                        <a:t>Robot</a:t>
+                      </a:r>
+                      <a:r>
+                        <a:rPr lang="en-US" baseline="0" dirty="0" smtClean="0"/>
+                        <a:t> Health</a:t>
+                      </a:r>
+                    </a:p>
+                  </a:txBody>
+                  <a:tcPr/>
+                </a:tc>
+                <a:tc>
+                  <a:txBody>
+                    <a:bodyPr/>
+                    <a:lstStyle/>
+                    <a:p>
+                      <a:r>
+                        <a:rPr lang="en-US" dirty="0" smtClean="0"/>
+                        <a:t>High</a:t>
+                      </a:r>
+                      <a:endParaRPr lang="en-US" dirty="0"/>
+                    </a:p>
+                  </a:txBody>
+                  <a:tcPr/>
+                </a:tc>
+                <a:tc>
+                  <a:txBody>
+                    <a:bodyPr/>
+                    <a:lstStyle/>
+                    <a:p>
+                      <a:r>
+                        <a:rPr lang="en-US" dirty="0" smtClean="0"/>
+                        <a:t>No testing platform</a:t>
+                      </a:r>
+                      <a:endParaRPr lang="en-US" dirty="0"/>
+                    </a:p>
+                  </a:txBody>
+                  <a:tcPr/>
+                </a:tc>
+                <a:tc>
+                  <a:txBody>
+                    <a:bodyPr/>
+                    <a:lstStyle/>
+                    <a:p>
+                      <a:r>
+                        <a:rPr lang="en-US" dirty="0" smtClean="0"/>
+                        <a:t>Continue to send in robots for repairs</a:t>
+                      </a:r>
+                      <a:endParaRPr lang="en-US" dirty="0"/>
+                    </a:p>
+                  </a:txBody>
+                  <a:tcPr/>
+                </a:tc>
+              </a:tr>
+              <a:tr h="1326799">
+                <a:tc>
+                  <a:txBody>
+                    <a:bodyPr/>
+                    <a:lstStyle/>
+                    <a:p>
+                      <a:r>
+                        <a:rPr lang="en-US" dirty="0" smtClean="0"/>
+                        <a:t>Old Source Code</a:t>
+                      </a:r>
+                      <a:endParaRPr lang="en-US" dirty="0"/>
+                    </a:p>
+                  </a:txBody>
+                  <a:tcPr/>
+                </a:tc>
+                <a:tc>
+                  <a:txBody>
+                    <a:bodyPr/>
+                    <a:lstStyle/>
+                    <a:p>
+                      <a:r>
+                        <a:rPr lang="en-US" dirty="0" smtClean="0"/>
+                        <a:t>Moderate</a:t>
+                      </a:r>
+                      <a:endParaRPr lang="en-US" dirty="0"/>
+                    </a:p>
+                  </a:txBody>
+                  <a:tcPr/>
+                </a:tc>
+                <a:tc>
+                  <a:txBody>
+                    <a:bodyPr/>
+                    <a:lstStyle/>
+                    <a:p>
+                      <a:r>
+                        <a:rPr lang="en-US" dirty="0" smtClean="0"/>
+                        <a:t>“Re-inventing the Wheel”</a:t>
+                      </a:r>
+                      <a:endParaRPr lang="en-US" dirty="0"/>
+                    </a:p>
+                  </a:txBody>
+                  <a:tcPr/>
+                </a:tc>
+                <a:tc>
+                  <a:txBody>
+                    <a:bodyPr/>
+                    <a:lstStyle/>
+                    <a:p>
+                      <a:r>
+                        <a:rPr lang="en-US" dirty="0" smtClean="0"/>
+                        <a:t>Contacting old capstone groups, use public repository</a:t>
+                      </a:r>
+                      <a:endParaRPr lang="en-US" dirty="0"/>
+                    </a:p>
+                  </a:txBody>
+                  <a:tcPr/>
+                </a:tc>
+              </a:tr>
+              <a:tr h="1326799">
+                <a:tc>
+                  <a:txBody>
+                    <a:bodyPr/>
+                    <a:lstStyle/>
+                    <a:p>
+                      <a:r>
+                        <a:rPr lang="en-US" dirty="0" smtClean="0"/>
+                        <a:t>Compacted Schedule</a:t>
+                      </a:r>
+                      <a:endParaRPr lang="en-US" dirty="0"/>
+                    </a:p>
+                  </a:txBody>
+                  <a:tcPr/>
+                </a:tc>
+                <a:tc>
+                  <a:txBody>
+                    <a:bodyPr/>
+                    <a:lstStyle/>
+                    <a:p>
+                      <a:r>
+                        <a:rPr lang="en-US" dirty="0" smtClean="0"/>
+                        <a:t>Moderate</a:t>
+                      </a:r>
+                      <a:endParaRPr lang="en-US" dirty="0"/>
+                    </a:p>
+                  </a:txBody>
+                  <a:tcPr/>
+                </a:tc>
+                <a:tc>
+                  <a:txBody>
+                    <a:bodyPr/>
+                    <a:lstStyle/>
+                    <a:p>
+                      <a:r>
+                        <a:rPr lang="en-US" dirty="0" smtClean="0"/>
+                        <a:t>Low</a:t>
+                      </a:r>
+                      <a:r>
+                        <a:rPr lang="en-US" baseline="0" dirty="0" smtClean="0"/>
+                        <a:t> work-efficiency </a:t>
+                      </a:r>
+                      <a:endParaRPr lang="en-US" dirty="0"/>
+                    </a:p>
+                  </a:txBody>
+                  <a:tcPr/>
+                </a:tc>
+                <a:tc>
+                  <a:txBody>
+                    <a:bodyPr/>
+                    <a:lstStyle/>
+                    <a:p>
+                      <a:r>
+                        <a:rPr lang="en-US" dirty="0" smtClean="0"/>
+                        <a:t>Better time management,</a:t>
+                      </a:r>
+                    </a:p>
+                    <a:p>
+                      <a:r>
+                        <a:rPr lang="en-US" dirty="0" smtClean="0"/>
+                        <a:t>Personal</a:t>
+                      </a:r>
+                      <a:r>
+                        <a:rPr lang="en-US" baseline="0" dirty="0" smtClean="0"/>
+                        <a:t> Hour Tracker</a:t>
+                      </a:r>
+                      <a:endParaRPr lang="en-US" dirty="0"/>
+                    </a:p>
+                  </a:txBody>
+                  <a:tcPr/>
+                </a:tc>
+              </a:tr>
+            </a:tbl>
+          </a:graphicData>
+        </a:graphic>
+      </p:graphicFrame>
+    </p:spTree>
+    <p:extLst>
+      <p:ext uri="{BB962C8B-B14F-4D97-AF65-F5344CB8AC3E}">
+        <p14:creationId xmlns:p14="http://schemas.microsoft.com/office/powerpoint/2010/main" val="3913718560"/>
       </p:ext>
     </p:extLst>
   </p:cSld>

</xml_diff>

<commit_message>
Began work on Tired Emotion
</commit_message>
<xml_diff>
--- a/NAO Sprint 2 Review.pptx
+++ b/NAO Sprint 2 Review.pptx
@@ -15427,11 +15427,7 @@
             <a:pPr lvl="1"/>
             <a:r>
               <a:rPr lang="en-US" dirty="0" smtClean="0"/>
-              <a:t>More Even </a:t>
-            </a:r>
-            <a:r>
-              <a:rPr lang="en-US" dirty="0" smtClean="0"/>
-              <a:t>Workload</a:t>
+              <a:t>More Even Workload</a:t>
             </a:r>
           </a:p>
           <a:p>
@@ -15439,7 +15435,6 @@
               <a:rPr lang="en-US" dirty="0" smtClean="0"/>
               <a:t>Improve Communication from some people…</a:t>
             </a:r>
-            <a:endParaRPr lang="en-US" dirty="0" smtClean="0"/>
           </a:p>
           <a:p>
             <a:endParaRPr lang="en-US" dirty="0"/>
@@ -15997,15 +15992,7 @@
           <a:p>
             <a:r>
               <a:rPr lang="en-US" dirty="0" smtClean="0"/>
-              <a:t>Sprint 2 </a:t>
-            </a:r>
-            <a:r>
-              <a:rPr lang="en-US" dirty="0" smtClean="0"/>
-              <a:t>Tasks</a:t>
-            </a:r>
-            <a:r>
-              <a:rPr lang="en-US" dirty="0" smtClean="0"/>
-              <a:t>	</a:t>
+              <a:t>Sprint 2 Tasks	</a:t>
             </a:r>
             <a:endParaRPr lang="en-US" dirty="0"/>
           </a:p>
@@ -16200,15 +16187,7 @@
           <a:p>
             <a:r>
               <a:rPr lang="en-US" dirty="0" smtClean="0"/>
-              <a:t>Sprint 2 </a:t>
-            </a:r>
-            <a:r>
-              <a:rPr lang="en-US" dirty="0" smtClean="0"/>
-              <a:t>Tasks </a:t>
-            </a:r>
-            <a:r>
-              <a:rPr lang="en-US" dirty="0" smtClean="0"/>
-              <a:t>(Cont.)</a:t>
+              <a:t>Sprint 2 Tasks (Cont.)</a:t>
             </a:r>
             <a:endParaRPr lang="en-US" dirty="0"/>
           </a:p>
@@ -16409,19 +16388,7 @@
           <a:p>
             <a:r>
               <a:rPr lang="en-US" dirty="0" smtClean="0"/>
-              <a:t>Sprint 2 </a:t>
-            </a:r>
-            <a:r>
-              <a:rPr lang="en-US" dirty="0" smtClean="0"/>
-              <a:t>Tasks </a:t>
-            </a:r>
-            <a:r>
-              <a:rPr lang="en-US" dirty="0" smtClean="0"/>
-              <a:t>(Cont</a:t>
-            </a:r>
-            <a:r>
-              <a:rPr lang="en-US" dirty="0" smtClean="0"/>
-              <a:t>.)</a:t>
+              <a:t>Sprint 2 Tasks (Cont.)</a:t>
             </a:r>
             <a:endParaRPr lang="en-US" dirty="0"/>
           </a:p>
@@ -16611,7 +16578,6 @@
               <a:rPr lang="en-US" dirty="0" smtClean="0"/>
               <a:t>Nao Robot</a:t>
             </a:r>
-            <a:endParaRPr lang="en-US" dirty="0" smtClean="0"/>
           </a:p>
         </p:txBody>
       </p:sp>
@@ -16707,7 +16673,7 @@
           <p:nvPr>
             <p:extLst>
               <p:ext uri="{D42A27DB-BD31-4B8C-83A1-F6EECF244321}">
-                <p14:modId xmlns:p14="http://schemas.microsoft.com/office/powerpoint/2010/main" val="318653209"/>
+                <p14:modId xmlns:p14="http://schemas.microsoft.com/office/powerpoint/2010/main" val="3129597554"/>
               </p:ext>
             </p:extLst>
           </p:nvPr>
@@ -16791,6 +16757,7 @@
                     <a:bodyPr/>
                     <a:lstStyle/>
                     <a:p>
+                      <a:pPr algn="ctr"/>
                       <a:r>
                         <a:rPr lang="en-US" dirty="0" smtClean="0"/>
                         <a:t>Robot</a:t>
@@ -16801,27 +16768,33 @@
                       </a:r>
                     </a:p>
                   </a:txBody>
-                  <a:tcPr/>
+                  <a:tcPr anchor="ctr"/>
                 </a:tc>
                 <a:tc>
                   <a:txBody>
                     <a:bodyPr/>
                     <a:lstStyle/>
                     <a:p>
+                      <a:pPr algn="ctr"/>
                       <a:r>
-                        <a:rPr lang="en-US" dirty="0" smtClean="0"/>
+                        <a:rPr lang="en-US" sz="2400" b="1" dirty="0" smtClean="0"/>
                         <a:t>High</a:t>
                       </a:r>
-                      <a:endParaRPr lang="en-US" dirty="0"/>
+                      <a:endParaRPr lang="en-US" sz="2400" b="1" dirty="0"/>
                     </a:p>
                   </a:txBody>
-                  <a:tcPr/>
+                  <a:tcPr anchor="ctr">
+                    <a:solidFill>
+                      <a:srgbClr val="FF0000"/>
+                    </a:solidFill>
+                  </a:tcPr>
                 </a:tc>
                 <a:tc>
                   <a:txBody>
                     <a:bodyPr/>
                     <a:lstStyle/>
                     <a:p>
+                      <a:pPr algn="ctr"/>
                       <a:r>
                         <a:rPr lang="en-US" dirty="0" smtClean="0"/>
                         <a:t>No testing platform</a:t>
@@ -16829,13 +16802,14 @@
                       <a:endParaRPr lang="en-US" dirty="0"/>
                     </a:p>
                   </a:txBody>
-                  <a:tcPr/>
+                  <a:tcPr anchor="ctr"/>
                 </a:tc>
                 <a:tc>
                   <a:txBody>
                     <a:bodyPr/>
                     <a:lstStyle/>
                     <a:p>
+                      <a:pPr algn="ctr"/>
                       <a:r>
                         <a:rPr lang="en-US" dirty="0" smtClean="0"/>
                         <a:t>Continue to send in robots for repairs</a:t>
@@ -16843,7 +16817,7 @@
                       <a:endParaRPr lang="en-US" dirty="0"/>
                     </a:p>
                   </a:txBody>
-                  <a:tcPr/>
+                  <a:tcPr anchor="ctr"/>
                 </a:tc>
               </a:tr>
               <a:tr h="1326799">
@@ -16852,6 +16826,7 @@
                     <a:bodyPr/>
                     <a:lstStyle/>
                     <a:p>
+                      <a:pPr algn="ctr"/>
                       <a:r>
                         <a:rPr lang="en-US" dirty="0" smtClean="0"/>
                         <a:t>Old Source Code</a:t>
@@ -16859,27 +16834,33 @@
                       <a:endParaRPr lang="en-US" dirty="0"/>
                     </a:p>
                   </a:txBody>
-                  <a:tcPr/>
+                  <a:tcPr anchor="ctr"/>
                 </a:tc>
                 <a:tc>
                   <a:txBody>
                     <a:bodyPr/>
                     <a:lstStyle/>
                     <a:p>
+                      <a:pPr algn="ctr"/>
                       <a:r>
-                        <a:rPr lang="en-US" dirty="0" smtClean="0"/>
+                        <a:rPr lang="en-US" sz="2400" b="1" dirty="0" smtClean="0"/>
                         <a:t>Moderate</a:t>
                       </a:r>
-                      <a:endParaRPr lang="en-US" dirty="0"/>
+                      <a:endParaRPr lang="en-US" sz="2400" b="1" dirty="0"/>
                     </a:p>
                   </a:txBody>
-                  <a:tcPr/>
+                  <a:tcPr anchor="ctr">
+                    <a:solidFill>
+                      <a:srgbClr val="FFFF00"/>
+                    </a:solidFill>
+                  </a:tcPr>
                 </a:tc>
                 <a:tc>
                   <a:txBody>
                     <a:bodyPr/>
                     <a:lstStyle/>
                     <a:p>
+                      <a:pPr algn="ctr"/>
                       <a:r>
                         <a:rPr lang="en-US" dirty="0" smtClean="0"/>
                         <a:t>“Re-inventing the Wheel”</a:t>
@@ -16887,13 +16868,14 @@
                       <a:endParaRPr lang="en-US" dirty="0"/>
                     </a:p>
                   </a:txBody>
-                  <a:tcPr/>
+                  <a:tcPr anchor="ctr"/>
                 </a:tc>
                 <a:tc>
                   <a:txBody>
                     <a:bodyPr/>
                     <a:lstStyle/>
                     <a:p>
+                      <a:pPr algn="ctr"/>
                       <a:r>
                         <a:rPr lang="en-US" dirty="0" smtClean="0"/>
                         <a:t>Contacting old capstone groups, use public repository</a:t>
@@ -16901,7 +16883,7 @@
                       <a:endParaRPr lang="en-US" dirty="0"/>
                     </a:p>
                   </a:txBody>
-                  <a:tcPr/>
+                  <a:tcPr anchor="ctr"/>
                 </a:tc>
               </a:tr>
               <a:tr h="1326799">
@@ -16910,6 +16892,7 @@
                     <a:bodyPr/>
                     <a:lstStyle/>
                     <a:p>
+                      <a:pPr algn="ctr"/>
                       <a:r>
                         <a:rPr lang="en-US" dirty="0" smtClean="0"/>
                         <a:t>Compacted Schedule</a:t>
@@ -16917,27 +16900,33 @@
                       <a:endParaRPr lang="en-US" dirty="0"/>
                     </a:p>
                   </a:txBody>
-                  <a:tcPr/>
+                  <a:tcPr anchor="ctr"/>
                 </a:tc>
                 <a:tc>
                   <a:txBody>
                     <a:bodyPr/>
                     <a:lstStyle/>
                     <a:p>
+                      <a:pPr algn="ctr"/>
                       <a:r>
-                        <a:rPr lang="en-US" dirty="0" smtClean="0"/>
+                        <a:rPr lang="en-US" sz="2400" b="1" dirty="0" smtClean="0"/>
                         <a:t>Moderate</a:t>
                       </a:r>
-                      <a:endParaRPr lang="en-US" dirty="0"/>
+                      <a:endParaRPr lang="en-US" sz="2400" b="1" dirty="0"/>
                     </a:p>
                   </a:txBody>
-                  <a:tcPr/>
+                  <a:tcPr anchor="ctr">
+                    <a:solidFill>
+                      <a:srgbClr val="FFFF00"/>
+                    </a:solidFill>
+                  </a:tcPr>
                 </a:tc>
                 <a:tc>
                   <a:txBody>
                     <a:bodyPr/>
                     <a:lstStyle/>
                     <a:p>
+                      <a:pPr algn="ctr"/>
                       <a:r>
                         <a:rPr lang="en-US" dirty="0" smtClean="0"/>
                         <a:t>Low</a:t>
@@ -16949,19 +16938,21 @@
                       <a:endParaRPr lang="en-US" dirty="0"/>
                     </a:p>
                   </a:txBody>
-                  <a:tcPr/>
+                  <a:tcPr anchor="ctr"/>
                 </a:tc>
                 <a:tc>
                   <a:txBody>
                     <a:bodyPr/>
                     <a:lstStyle/>
                     <a:p>
+                      <a:pPr algn="ctr"/>
                       <a:r>
                         <a:rPr lang="en-US" dirty="0" smtClean="0"/>
                         <a:t>Better time management,</a:t>
                       </a:r>
                     </a:p>
                     <a:p>
+                      <a:pPr algn="ctr"/>
                       <a:r>
                         <a:rPr lang="en-US" dirty="0" smtClean="0"/>
                         <a:t>Personal</a:t>
@@ -16973,7 +16964,7 @@
                       <a:endParaRPr lang="en-US" dirty="0"/>
                     </a:p>
                   </a:txBody>
-                  <a:tcPr/>
+                  <a:tcPr anchor="ctr"/>
                 </a:tc>
               </a:tr>
             </a:tbl>

</xml_diff>